<commit_message>
Add Redume for newcommer's Lecture
</commit_message>
<xml_diff>
--- a/新人研修.pptx
+++ b/新人研修.pptx
@@ -4,12 +4,15 @@
   <p:sldMasterIdLst>
     <p:sldMasterId id="2147483648" r:id="rId1"/>
   </p:sldMasterIdLst>
+  <p:notesMasterIdLst>
+    <p:notesMasterId r:id="rId9"/>
+  </p:notesMasterIdLst>
   <p:sldIdLst>
     <p:sldId id="267" r:id="rId2"/>
     <p:sldId id="268" r:id="rId3"/>
     <p:sldId id="258" r:id="rId4"/>
-    <p:sldId id="261" r:id="rId5"/>
-    <p:sldId id="264" r:id="rId6"/>
+    <p:sldId id="264" r:id="rId5"/>
+    <p:sldId id="261" r:id="rId6"/>
     <p:sldId id="266" r:id="rId7"/>
     <p:sldId id="263" r:id="rId8"/>
   </p:sldIdLst>
@@ -112,7 +115,7 @@
   </p:defaultTextStyle>
   <p:extLst>
     <p:ext uri="{EFAFB233-063F-42B5-8137-9DF3F51BA10A}">
-      <p15:sldGuideLst xmlns:p15="http://schemas.microsoft.com/office/powerpoint/2012/main">
+      <p15:sldGuideLst xmlns="" xmlns:p15="http://schemas.microsoft.com/office/powerpoint/2012/main">
         <p15:guide id="1" orient="horz" pos="2160">
           <p15:clr>
             <a:srgbClr val="A4A3A4"/>
@@ -127,6 +130,484 @@
     </p:ext>
   </p:extLst>
 </p:presentation>
+</file>
+
+<file path=ppt/notesMasters/notesMaster1.xml><?xml version="1.0" encoding="utf-8"?>
+<p:notesMaster xmlns:a="http://schemas.openxmlformats.org/drawingml/2006/main" xmlns:r="http://schemas.openxmlformats.org/officeDocument/2006/relationships" xmlns:p="http://schemas.openxmlformats.org/presentationml/2006/main">
+  <p:cSld>
+    <p:bg>
+      <p:bgRef idx="1001">
+        <a:schemeClr val="bg1"/>
+      </p:bgRef>
+    </p:bg>
+    <p:spTree>
+      <p:nvGrpSpPr>
+        <p:cNvPr id="1" name=""/>
+        <p:cNvGrpSpPr/>
+        <p:nvPr/>
+      </p:nvGrpSpPr>
+      <p:grpSpPr>
+        <a:xfrm>
+          <a:off x="0" y="0"/>
+          <a:ext cx="0" cy="0"/>
+          <a:chOff x="0" y="0"/>
+          <a:chExt cx="0" cy="0"/>
+        </a:xfrm>
+      </p:grpSpPr>
+      <p:sp>
+        <p:nvSpPr>
+          <p:cNvPr id="2" name="ヘッダー プレースホルダー 1"/>
+          <p:cNvSpPr>
+            <a:spLocks noGrp="1"/>
+          </p:cNvSpPr>
+          <p:nvPr>
+            <p:ph type="hdr" sz="quarter"/>
+          </p:nvPr>
+        </p:nvSpPr>
+        <p:spPr>
+          <a:xfrm>
+            <a:off x="0" y="0"/>
+            <a:ext cx="2971800" cy="457200"/>
+          </a:xfrm>
+          <a:prstGeom prst="rect">
+            <a:avLst/>
+          </a:prstGeom>
+        </p:spPr>
+        <p:txBody>
+          <a:bodyPr vert="horz" lIns="91440" tIns="45720" rIns="91440" bIns="45720" rtlCol="0"/>
+          <a:lstStyle>
+            <a:lvl1pPr algn="l">
+              <a:defRPr sz="1200"/>
+            </a:lvl1pPr>
+          </a:lstStyle>
+          <a:p>
+            <a:endParaRPr kumimoji="1" lang="ja-JP" altLang="en-US"/>
+          </a:p>
+        </p:txBody>
+      </p:sp>
+      <p:sp>
+        <p:nvSpPr>
+          <p:cNvPr id="3" name="日付プレースホルダー 2"/>
+          <p:cNvSpPr>
+            <a:spLocks noGrp="1"/>
+          </p:cNvSpPr>
+          <p:nvPr>
+            <p:ph type="dt" idx="1"/>
+          </p:nvPr>
+        </p:nvSpPr>
+        <p:spPr>
+          <a:xfrm>
+            <a:off x="3884613" y="0"/>
+            <a:ext cx="2971800" cy="457200"/>
+          </a:xfrm>
+          <a:prstGeom prst="rect">
+            <a:avLst/>
+          </a:prstGeom>
+        </p:spPr>
+        <p:txBody>
+          <a:bodyPr vert="horz" lIns="91440" tIns="45720" rIns="91440" bIns="45720" rtlCol="0"/>
+          <a:lstStyle>
+            <a:lvl1pPr algn="r">
+              <a:defRPr sz="1200"/>
+            </a:lvl1pPr>
+          </a:lstStyle>
+          <a:p>
+            <a:fld id="{100FE6D1-2E1F-470F-AA5B-B6A9471248C1}" type="datetimeFigureOut">
+              <a:rPr kumimoji="1" lang="ja-JP" altLang="en-US" smtClean="0"/>
+              <a:t>2016/5/27</a:t>
+            </a:fld>
+            <a:endParaRPr kumimoji="1" lang="ja-JP" altLang="en-US"/>
+          </a:p>
+        </p:txBody>
+      </p:sp>
+      <p:sp>
+        <p:nvSpPr>
+          <p:cNvPr id="4" name="スライド イメージ プレースホルダー 3"/>
+          <p:cNvSpPr>
+            <a:spLocks noGrp="1" noRot="1" noChangeAspect="1"/>
+          </p:cNvSpPr>
+          <p:nvPr>
+            <p:ph type="sldImg" idx="2"/>
+          </p:nvPr>
+        </p:nvSpPr>
+        <p:spPr>
+          <a:xfrm>
+            <a:off x="1143000" y="685800"/>
+            <a:ext cx="4572000" cy="3429000"/>
+          </a:xfrm>
+          <a:prstGeom prst="rect">
+            <a:avLst/>
+          </a:prstGeom>
+          <a:noFill/>
+          <a:ln w="12700">
+            <a:solidFill>
+              <a:prstClr val="black"/>
+            </a:solidFill>
+          </a:ln>
+        </p:spPr>
+        <p:txBody>
+          <a:bodyPr vert="horz" lIns="91440" tIns="45720" rIns="91440" bIns="45720" rtlCol="0" anchor="ctr"/>
+          <a:lstStyle/>
+          <a:p>
+            <a:endParaRPr lang="ja-JP" altLang="en-US"/>
+          </a:p>
+        </p:txBody>
+      </p:sp>
+      <p:sp>
+        <p:nvSpPr>
+          <p:cNvPr id="5" name="ノート プレースホルダー 4"/>
+          <p:cNvSpPr>
+            <a:spLocks noGrp="1"/>
+          </p:cNvSpPr>
+          <p:nvPr>
+            <p:ph type="body" sz="quarter" idx="3"/>
+          </p:nvPr>
+        </p:nvSpPr>
+        <p:spPr>
+          <a:xfrm>
+            <a:off x="685800" y="4343400"/>
+            <a:ext cx="5486400" cy="4114800"/>
+          </a:xfrm>
+          <a:prstGeom prst="rect">
+            <a:avLst/>
+          </a:prstGeom>
+        </p:spPr>
+        <p:txBody>
+          <a:bodyPr vert="horz" lIns="91440" tIns="45720" rIns="91440" bIns="45720" rtlCol="0"/>
+          <a:lstStyle/>
+          <a:p>
+            <a:pPr lvl="0"/>
+            <a:r>
+              <a:rPr kumimoji="1" lang="ja-JP" altLang="en-US" smtClean="0"/>
+              <a:t>マスター テキストの書式設定</a:t>
+            </a:r>
+          </a:p>
+          <a:p>
+            <a:pPr lvl="1"/>
+            <a:r>
+              <a:rPr kumimoji="1" lang="ja-JP" altLang="en-US" smtClean="0"/>
+              <a:t>第 </a:t>
+            </a:r>
+            <a:r>
+              <a:rPr kumimoji="1" lang="en-US" altLang="ja-JP" smtClean="0"/>
+              <a:t>2 </a:t>
+            </a:r>
+            <a:r>
+              <a:rPr kumimoji="1" lang="ja-JP" altLang="en-US" smtClean="0"/>
+              <a:t>レベル</a:t>
+            </a:r>
+          </a:p>
+          <a:p>
+            <a:pPr lvl="2"/>
+            <a:r>
+              <a:rPr kumimoji="1" lang="ja-JP" altLang="en-US" smtClean="0"/>
+              <a:t>第 </a:t>
+            </a:r>
+            <a:r>
+              <a:rPr kumimoji="1" lang="en-US" altLang="ja-JP" smtClean="0"/>
+              <a:t>3 </a:t>
+            </a:r>
+            <a:r>
+              <a:rPr kumimoji="1" lang="ja-JP" altLang="en-US" smtClean="0"/>
+              <a:t>レベル</a:t>
+            </a:r>
+          </a:p>
+          <a:p>
+            <a:pPr lvl="3"/>
+            <a:r>
+              <a:rPr kumimoji="1" lang="ja-JP" altLang="en-US" smtClean="0"/>
+              <a:t>第 </a:t>
+            </a:r>
+            <a:r>
+              <a:rPr kumimoji="1" lang="en-US" altLang="ja-JP" smtClean="0"/>
+              <a:t>4 </a:t>
+            </a:r>
+            <a:r>
+              <a:rPr kumimoji="1" lang="ja-JP" altLang="en-US" smtClean="0"/>
+              <a:t>レベル</a:t>
+            </a:r>
+          </a:p>
+          <a:p>
+            <a:pPr lvl="4"/>
+            <a:r>
+              <a:rPr kumimoji="1" lang="ja-JP" altLang="en-US" smtClean="0"/>
+              <a:t>第 </a:t>
+            </a:r>
+            <a:r>
+              <a:rPr kumimoji="1" lang="en-US" altLang="ja-JP" smtClean="0"/>
+              <a:t>5 </a:t>
+            </a:r>
+            <a:r>
+              <a:rPr kumimoji="1" lang="ja-JP" altLang="en-US" smtClean="0"/>
+              <a:t>レベル</a:t>
+            </a:r>
+            <a:endParaRPr kumimoji="1" lang="ja-JP" altLang="en-US"/>
+          </a:p>
+        </p:txBody>
+      </p:sp>
+      <p:sp>
+        <p:nvSpPr>
+          <p:cNvPr id="6" name="フッター プレースホルダー 5"/>
+          <p:cNvSpPr>
+            <a:spLocks noGrp="1"/>
+          </p:cNvSpPr>
+          <p:nvPr>
+            <p:ph type="ftr" sz="quarter" idx="4"/>
+          </p:nvPr>
+        </p:nvSpPr>
+        <p:spPr>
+          <a:xfrm>
+            <a:off x="0" y="8685213"/>
+            <a:ext cx="2971800" cy="457200"/>
+          </a:xfrm>
+          <a:prstGeom prst="rect">
+            <a:avLst/>
+          </a:prstGeom>
+        </p:spPr>
+        <p:txBody>
+          <a:bodyPr vert="horz" lIns="91440" tIns="45720" rIns="91440" bIns="45720" rtlCol="0" anchor="b"/>
+          <a:lstStyle>
+            <a:lvl1pPr algn="l">
+              <a:defRPr sz="1200"/>
+            </a:lvl1pPr>
+          </a:lstStyle>
+          <a:p>
+            <a:endParaRPr kumimoji="1" lang="ja-JP" altLang="en-US"/>
+          </a:p>
+        </p:txBody>
+      </p:sp>
+      <p:sp>
+        <p:nvSpPr>
+          <p:cNvPr id="7" name="スライド番号プレースホルダー 6"/>
+          <p:cNvSpPr>
+            <a:spLocks noGrp="1"/>
+          </p:cNvSpPr>
+          <p:nvPr>
+            <p:ph type="sldNum" sz="quarter" idx="5"/>
+          </p:nvPr>
+        </p:nvSpPr>
+        <p:spPr>
+          <a:xfrm>
+            <a:off x="3884613" y="8685213"/>
+            <a:ext cx="2971800" cy="457200"/>
+          </a:xfrm>
+          <a:prstGeom prst="rect">
+            <a:avLst/>
+          </a:prstGeom>
+        </p:spPr>
+        <p:txBody>
+          <a:bodyPr vert="horz" lIns="91440" tIns="45720" rIns="91440" bIns="45720" rtlCol="0" anchor="b"/>
+          <a:lstStyle>
+            <a:lvl1pPr algn="r">
+              <a:defRPr sz="1200"/>
+            </a:lvl1pPr>
+          </a:lstStyle>
+          <a:p>
+            <a:fld id="{E603631E-C7ED-491D-83DC-D1C3550738C8}" type="slidenum">
+              <a:rPr kumimoji="1" lang="ja-JP" altLang="en-US" smtClean="0"/>
+              <a:t>‹#›</a:t>
+            </a:fld>
+            <a:endParaRPr kumimoji="1" lang="ja-JP" altLang="en-US"/>
+          </a:p>
+        </p:txBody>
+      </p:sp>
+    </p:spTree>
+    <p:extLst>
+      <p:ext uri="{BB962C8B-B14F-4D97-AF65-F5344CB8AC3E}">
+        <p14:creationId xmlns:p14="http://schemas.microsoft.com/office/powerpoint/2010/main" val="449991667"/>
+      </p:ext>
+    </p:extLst>
+  </p:cSld>
+  <p:clrMap bg1="lt1" tx1="dk1" bg2="lt2" tx2="dk2" accent1="accent1" accent2="accent2" accent3="accent3" accent4="accent4" accent5="accent5" accent6="accent6" hlink="hlink" folHlink="folHlink"/>
+  <p:notesStyle>
+    <a:lvl1pPr marL="0" algn="l" defTabSz="914400" rtl="0" eaLnBrk="1" latinLnBrk="0" hangingPunct="1">
+      <a:defRPr kumimoji="1" sz="1200" kern="1200">
+        <a:solidFill>
+          <a:schemeClr val="tx1"/>
+        </a:solidFill>
+        <a:latin typeface="+mn-lt"/>
+        <a:ea typeface="+mn-ea"/>
+        <a:cs typeface="+mn-cs"/>
+      </a:defRPr>
+    </a:lvl1pPr>
+    <a:lvl2pPr marL="457200" algn="l" defTabSz="914400" rtl="0" eaLnBrk="1" latinLnBrk="0" hangingPunct="1">
+      <a:defRPr kumimoji="1" sz="1200" kern="1200">
+        <a:solidFill>
+          <a:schemeClr val="tx1"/>
+        </a:solidFill>
+        <a:latin typeface="+mn-lt"/>
+        <a:ea typeface="+mn-ea"/>
+        <a:cs typeface="+mn-cs"/>
+      </a:defRPr>
+    </a:lvl2pPr>
+    <a:lvl3pPr marL="914400" algn="l" defTabSz="914400" rtl="0" eaLnBrk="1" latinLnBrk="0" hangingPunct="1">
+      <a:defRPr kumimoji="1" sz="1200" kern="1200">
+        <a:solidFill>
+          <a:schemeClr val="tx1"/>
+        </a:solidFill>
+        <a:latin typeface="+mn-lt"/>
+        <a:ea typeface="+mn-ea"/>
+        <a:cs typeface="+mn-cs"/>
+      </a:defRPr>
+    </a:lvl3pPr>
+    <a:lvl4pPr marL="1371600" algn="l" defTabSz="914400" rtl="0" eaLnBrk="1" latinLnBrk="0" hangingPunct="1">
+      <a:defRPr kumimoji="1" sz="1200" kern="1200">
+        <a:solidFill>
+          <a:schemeClr val="tx1"/>
+        </a:solidFill>
+        <a:latin typeface="+mn-lt"/>
+        <a:ea typeface="+mn-ea"/>
+        <a:cs typeface="+mn-cs"/>
+      </a:defRPr>
+    </a:lvl4pPr>
+    <a:lvl5pPr marL="1828800" algn="l" defTabSz="914400" rtl="0" eaLnBrk="1" latinLnBrk="0" hangingPunct="1">
+      <a:defRPr kumimoji="1" sz="1200" kern="1200">
+        <a:solidFill>
+          <a:schemeClr val="tx1"/>
+        </a:solidFill>
+        <a:latin typeface="+mn-lt"/>
+        <a:ea typeface="+mn-ea"/>
+        <a:cs typeface="+mn-cs"/>
+      </a:defRPr>
+    </a:lvl5pPr>
+    <a:lvl6pPr marL="2286000" algn="l" defTabSz="914400" rtl="0" eaLnBrk="1" latinLnBrk="0" hangingPunct="1">
+      <a:defRPr kumimoji="1" sz="1200" kern="1200">
+        <a:solidFill>
+          <a:schemeClr val="tx1"/>
+        </a:solidFill>
+        <a:latin typeface="+mn-lt"/>
+        <a:ea typeface="+mn-ea"/>
+        <a:cs typeface="+mn-cs"/>
+      </a:defRPr>
+    </a:lvl6pPr>
+    <a:lvl7pPr marL="2743200" algn="l" defTabSz="914400" rtl="0" eaLnBrk="1" latinLnBrk="0" hangingPunct="1">
+      <a:defRPr kumimoji="1" sz="1200" kern="1200">
+        <a:solidFill>
+          <a:schemeClr val="tx1"/>
+        </a:solidFill>
+        <a:latin typeface="+mn-lt"/>
+        <a:ea typeface="+mn-ea"/>
+        <a:cs typeface="+mn-cs"/>
+      </a:defRPr>
+    </a:lvl7pPr>
+    <a:lvl8pPr marL="3200400" algn="l" defTabSz="914400" rtl="0" eaLnBrk="1" latinLnBrk="0" hangingPunct="1">
+      <a:defRPr kumimoji="1" sz="1200" kern="1200">
+        <a:solidFill>
+          <a:schemeClr val="tx1"/>
+        </a:solidFill>
+        <a:latin typeface="+mn-lt"/>
+        <a:ea typeface="+mn-ea"/>
+        <a:cs typeface="+mn-cs"/>
+      </a:defRPr>
+    </a:lvl8pPr>
+    <a:lvl9pPr marL="3657600" algn="l" defTabSz="914400" rtl="0" eaLnBrk="1" latinLnBrk="0" hangingPunct="1">
+      <a:defRPr kumimoji="1" sz="1200" kern="1200">
+        <a:solidFill>
+          <a:schemeClr val="tx1"/>
+        </a:solidFill>
+        <a:latin typeface="+mn-lt"/>
+        <a:ea typeface="+mn-ea"/>
+        <a:cs typeface="+mn-cs"/>
+      </a:defRPr>
+    </a:lvl9pPr>
+  </p:notesStyle>
+</p:notesMaster>
+</file>
+
+<file path=ppt/notesSlides/notesSlide1.xml><?xml version="1.0" encoding="utf-8"?>
+<p:notes xmlns:a="http://schemas.openxmlformats.org/drawingml/2006/main" xmlns:r="http://schemas.openxmlformats.org/officeDocument/2006/relationships" xmlns:p="http://schemas.openxmlformats.org/presentationml/2006/main">
+  <p:cSld>
+    <p:spTree>
+      <p:nvGrpSpPr>
+        <p:cNvPr id="1" name=""/>
+        <p:cNvGrpSpPr/>
+        <p:nvPr/>
+      </p:nvGrpSpPr>
+      <p:grpSpPr>
+        <a:xfrm>
+          <a:off x="0" y="0"/>
+          <a:ext cx="0" cy="0"/>
+          <a:chOff x="0" y="0"/>
+          <a:chExt cx="0" cy="0"/>
+        </a:xfrm>
+      </p:grpSpPr>
+      <p:sp>
+        <p:nvSpPr>
+          <p:cNvPr id="2" name="スライド イメージ プレースホルダー 1"/>
+          <p:cNvSpPr>
+            <a:spLocks noGrp="1" noRot="1" noChangeAspect="1"/>
+          </p:cNvSpPr>
+          <p:nvPr>
+            <p:ph type="sldImg"/>
+          </p:nvPr>
+        </p:nvSpPr>
+        <p:spPr/>
+      </p:sp>
+      <p:sp>
+        <p:nvSpPr>
+          <p:cNvPr id="3" name="ノート プレースホルダー 2"/>
+          <p:cNvSpPr>
+            <a:spLocks noGrp="1"/>
+          </p:cNvSpPr>
+          <p:nvPr>
+            <p:ph type="body" idx="1"/>
+          </p:nvPr>
+        </p:nvSpPr>
+        <p:spPr/>
+        <p:txBody>
+          <a:bodyPr/>
+          <a:lstStyle/>
+          <a:p>
+            <a:r>
+              <a:rPr kumimoji="1" lang="ja-JP" altLang="en-US" dirty="0" smtClean="0"/>
+              <a:t>初週は</a:t>
+            </a:r>
+          </a:p>
+          <a:p>
+            <a:r>
+              <a:rPr kumimoji="1" lang="ja-JP" altLang="en-US" dirty="0" smtClean="0"/>
+              <a:t>・方法論</a:t>
+            </a:r>
+          </a:p>
+          <a:p>
+            <a:endParaRPr kumimoji="1" lang="ja-JP" altLang="en-US" dirty="0"/>
+          </a:p>
+        </p:txBody>
+      </p:sp>
+      <p:sp>
+        <p:nvSpPr>
+          <p:cNvPr id="4" name="スライド番号プレースホルダー 3"/>
+          <p:cNvSpPr>
+            <a:spLocks noGrp="1"/>
+          </p:cNvSpPr>
+          <p:nvPr>
+            <p:ph type="sldNum" sz="quarter" idx="10"/>
+          </p:nvPr>
+        </p:nvSpPr>
+        <p:spPr/>
+        <p:txBody>
+          <a:bodyPr/>
+          <a:lstStyle/>
+          <a:p>
+            <a:fld id="{E603631E-C7ED-491D-83DC-D1C3550738C8}" type="slidenum">
+              <a:rPr kumimoji="1" lang="ja-JP" altLang="en-US" smtClean="0"/>
+              <a:t>6</a:t>
+            </a:fld>
+            <a:endParaRPr kumimoji="1" lang="ja-JP" altLang="en-US"/>
+          </a:p>
+        </p:txBody>
+      </p:sp>
+    </p:spTree>
+    <p:extLst>
+      <p:ext uri="{BB962C8B-B14F-4D97-AF65-F5344CB8AC3E}">
+        <p14:creationId xmlns:p14="http://schemas.microsoft.com/office/powerpoint/2010/main" val="3758289735"/>
+      </p:ext>
+    </p:extLst>
+  </p:cSld>
+  <p:clrMapOvr>
+    <a:masterClrMapping/>
+  </p:clrMapOvr>
+</p:notes>
 </file>
 
 <file path=ppt/slideLayouts/slideLayout1.xml><?xml version="1.0" encoding="utf-8"?>
@@ -310,7 +791,7 @@
           <a:p>
             <a:fld id="{E90ED720-0104-4369-84BC-D37694168613}" type="datetimeFigureOut">
               <a:rPr kumimoji="1" lang="ja-JP" altLang="en-US" smtClean="0"/>
-              <a:t>2016/5/19</a:t>
+              <a:t>2016/5/27</a:t>
             </a:fld>
             <a:endParaRPr kumimoji="1" lang="ja-JP" altLang="en-US"/>
           </a:p>
@@ -514,7 +995,7 @@
           <a:p>
             <a:fld id="{E90ED720-0104-4369-84BC-D37694168613}" type="datetimeFigureOut">
               <a:rPr kumimoji="1" lang="ja-JP" altLang="en-US" smtClean="0"/>
-              <a:t>2016/5/19</a:t>
+              <a:t>2016/5/27</a:t>
             </a:fld>
             <a:endParaRPr kumimoji="1" lang="ja-JP" altLang="en-US"/>
           </a:p>
@@ -721,7 +1202,7 @@
           <a:p>
             <a:fld id="{E90ED720-0104-4369-84BC-D37694168613}" type="datetimeFigureOut">
               <a:rPr kumimoji="1" lang="ja-JP" altLang="en-US" smtClean="0"/>
-              <a:t>2016/5/19</a:t>
+              <a:t>2016/5/27</a:t>
             </a:fld>
             <a:endParaRPr kumimoji="1" lang="ja-JP" altLang="en-US"/>
           </a:p>
@@ -1123,7 +1604,7 @@
           <a:p>
             <a:fld id="{E90ED720-0104-4369-84BC-D37694168613}" type="datetimeFigureOut">
               <a:rPr kumimoji="1" lang="ja-JP" altLang="en-US" smtClean="0"/>
-              <a:t>2016/5/19</a:t>
+              <a:t>2016/5/27</a:t>
             </a:fld>
             <a:endParaRPr kumimoji="1" lang="ja-JP" altLang="en-US"/>
           </a:p>
@@ -1477,7 +1958,7 @@
           <a:p>
             <a:fld id="{E90ED720-0104-4369-84BC-D37694168613}" type="datetimeFigureOut">
               <a:rPr kumimoji="1" lang="ja-JP" altLang="en-US" smtClean="0"/>
-              <a:t>2016/5/19</a:t>
+              <a:t>2016/5/27</a:t>
             </a:fld>
             <a:endParaRPr kumimoji="1" lang="ja-JP" altLang="en-US"/>
           </a:p>
@@ -1958,7 +2439,7 @@
           <a:p>
             <a:fld id="{E90ED720-0104-4369-84BC-D37694168613}" type="datetimeFigureOut">
               <a:rPr kumimoji="1" lang="ja-JP" altLang="en-US" smtClean="0"/>
-              <a:t>2016/5/19</a:t>
+              <a:t>2016/5/27</a:t>
             </a:fld>
             <a:endParaRPr kumimoji="1" lang="ja-JP" altLang="en-US"/>
           </a:p>
@@ -2071,7 +2552,7 @@
           <a:p>
             <a:fld id="{E90ED720-0104-4369-84BC-D37694168613}" type="datetimeFigureOut">
               <a:rPr kumimoji="1" lang="ja-JP" altLang="en-US" smtClean="0"/>
-              <a:t>2016/5/19</a:t>
+              <a:t>2016/5/27</a:t>
             </a:fld>
             <a:endParaRPr kumimoji="1" lang="ja-JP" altLang="en-US"/>
           </a:p>
@@ -2161,7 +2642,7 @@
           <a:p>
             <a:fld id="{E90ED720-0104-4369-84BC-D37694168613}" type="datetimeFigureOut">
               <a:rPr kumimoji="1" lang="ja-JP" altLang="en-US" smtClean="0"/>
-              <a:t>2016/5/19</a:t>
+              <a:t>2016/5/27</a:t>
             </a:fld>
             <a:endParaRPr kumimoji="1" lang="ja-JP" altLang="en-US"/>
           </a:p>
@@ -2465,7 +2946,7 @@
           <a:p>
             <a:fld id="{E90ED720-0104-4369-84BC-D37694168613}" type="datetimeFigureOut">
               <a:rPr kumimoji="1" lang="ja-JP" altLang="en-US" smtClean="0"/>
-              <a:t>2016/5/19</a:t>
+              <a:t>2016/5/27</a:t>
             </a:fld>
             <a:endParaRPr kumimoji="1" lang="ja-JP" altLang="en-US"/>
           </a:p>
@@ -2713,7 +3194,7 @@
           <a:p>
             <a:fld id="{E90ED720-0104-4369-84BC-D37694168613}" type="datetimeFigureOut">
               <a:rPr kumimoji="1" lang="ja-JP" altLang="en-US" smtClean="0"/>
-              <a:t>2016/5/19</a:t>
+              <a:t>2016/5/27</a:t>
             </a:fld>
             <a:endParaRPr kumimoji="1" lang="ja-JP" altLang="en-US"/>
           </a:p>
@@ -2953,7 +3434,7 @@
           <a:p>
             <a:fld id="{E90ED720-0104-4369-84BC-D37694168613}" type="datetimeFigureOut">
               <a:rPr kumimoji="1" lang="ja-JP" altLang="en-US" smtClean="0"/>
-              <a:t>2016/5/19</a:t>
+              <a:t>2016/5/27</a:t>
             </a:fld>
             <a:endParaRPr kumimoji="1" lang="ja-JP" altLang="en-US"/>
           </a:p>
@@ -3379,30 +3860,15 @@
           <a:p>
             <a:r>
               <a:rPr kumimoji="1" lang="ja-JP" altLang="en-US" sz="2800" dirty="0" smtClean="0"/>
-              <a:t>研修</a:t>
-            </a:r>
-            <a:r>
-              <a:rPr kumimoji="1" lang="ja-JP" altLang="en-US" sz="2800" dirty="0" smtClean="0"/>
-              <a:t>内容</a:t>
+              <a:t>研修の進め方</a:t>
             </a:r>
             <a:endParaRPr kumimoji="1" lang="en-US" altLang="ja-JP" sz="2800" dirty="0" smtClean="0"/>
           </a:p>
           <a:p>
-            <a:r>
-              <a:rPr kumimoji="1" lang="ja-JP" altLang="en-US" sz="2800" dirty="0" smtClean="0"/>
-              <a:t>研修の進め方</a:t>
-            </a:r>
-            <a:endParaRPr kumimoji="1" lang="en-US" altLang="ja-JP" sz="2800" dirty="0" smtClean="0"/>
-          </a:p>
-          <a:p>
             <a:pPr lvl="1"/>
             <a:r>
               <a:rPr kumimoji="1" lang="ja-JP" altLang="en-US" sz="2400" dirty="0" smtClean="0"/>
-              <a:t>研修</a:t>
-            </a:r>
-            <a:r>
-              <a:rPr kumimoji="1" lang="ja-JP" altLang="en-US" sz="2400" dirty="0" smtClean="0"/>
-              <a:t>開始前</a:t>
+              <a:t>研修開始前</a:t>
             </a:r>
             <a:endParaRPr kumimoji="1" lang="en-US" altLang="ja-JP" sz="2000" dirty="0" smtClean="0"/>
           </a:p>
@@ -3417,6 +3883,16 @@
               <a:t>開始後</a:t>
             </a:r>
             <a:endParaRPr lang="en-US" altLang="ja-JP" sz="2400" dirty="0" smtClean="0"/>
+          </a:p>
+          <a:p>
+            <a:r>
+              <a:rPr lang="ja-JP" altLang="en-US" sz="2800" dirty="0" smtClean="0"/>
+              <a:t>研修内容</a:t>
+            </a:r>
+            <a:endParaRPr lang="en-US" altLang="ja-JP" sz="2800" dirty="0"/>
+          </a:p>
+          <a:p>
+            <a:endParaRPr lang="en-US" altLang="ja-JP" dirty="0" smtClean="0"/>
           </a:p>
         </p:txBody>
       </p:sp>
@@ -3622,7 +4098,7 @@
           <a:p>
             <a:r>
               <a:rPr lang="ja-JP" altLang="en-US" sz="2800" dirty="0" smtClean="0"/>
-              <a:t>配属先</a:t>
+              <a:t>配属先・・・未定</a:t>
             </a:r>
             <a:endParaRPr lang="en-US" altLang="ja-JP" sz="2800" dirty="0" smtClean="0"/>
           </a:p>
@@ -3678,7 +4154,7 @@
           <a:p>
             <a:pPr lvl="1"/>
             <a:r>
-              <a:rPr lang="ja-JP" altLang="en-US" dirty="0" smtClean="0"/>
+              <a:rPr lang="ja-JP" altLang="en-US" sz="2400" dirty="0" smtClean="0"/>
               <a:t>呉屋</a:t>
             </a:r>
             <a:endParaRPr lang="en-US" altLang="ja-JP" dirty="0" smtClean="0"/>
@@ -3686,8 +4162,8 @@
           <a:p>
             <a:pPr lvl="2"/>
             <a:r>
-              <a:rPr lang="ja-JP" altLang="en-US" sz="2000" dirty="0"/>
-              <a:t>沖縄</a:t>
+              <a:rPr lang="ja-JP" altLang="en-US" sz="2000" dirty="0" smtClean="0"/>
+              <a:t>９末まで新横浜→沖縄</a:t>
             </a:r>
             <a:r>
               <a:rPr lang="en-US" altLang="ja-JP" dirty="0"/>
@@ -3774,40 +4250,40 @@
         </p:spPr>
         <p:txBody>
           <a:bodyPr>
-            <a:normAutofit lnSpcReduction="10000"/>
+            <a:normAutofit fontScale="85000" lnSpcReduction="20000"/>
           </a:bodyPr>
           <a:lstStyle/>
           <a:p>
             <a:r>
-              <a:rPr lang="ja-JP" altLang="en-US" sz="2600" dirty="0" smtClean="0"/>
+              <a:rPr lang="ja-JP" altLang="en-US" sz="2800" dirty="0" smtClean="0"/>
               <a:t>期間</a:t>
             </a:r>
-            <a:endParaRPr lang="en-US" altLang="ja-JP" sz="2600" dirty="0" smtClean="0"/>
+            <a:endParaRPr lang="en-US" altLang="ja-JP" sz="2800" dirty="0" smtClean="0"/>
           </a:p>
           <a:p>
             <a:pPr lvl="1"/>
             <a:r>
-              <a:rPr lang="en-US" altLang="ja-JP" sz="2000" dirty="0" smtClean="0"/>
+              <a:rPr lang="en-US" altLang="ja-JP" sz="2100" dirty="0" smtClean="0"/>
               <a:t>6/6</a:t>
             </a:r>
             <a:r>
-              <a:rPr lang="ja-JP" altLang="en-US" sz="2000" dirty="0" smtClean="0"/>
+              <a:rPr lang="ja-JP" altLang="en-US" sz="2100" dirty="0" smtClean="0"/>
               <a:t>（月）～</a:t>
             </a:r>
             <a:r>
-              <a:rPr lang="en-US" altLang="ja-JP" sz="2000" dirty="0" smtClean="0"/>
+              <a:rPr lang="en-US" altLang="ja-JP" sz="2100" dirty="0" smtClean="0"/>
               <a:t>6/27</a:t>
             </a:r>
             <a:r>
-              <a:rPr lang="ja-JP" altLang="en-US" sz="2000" dirty="0" smtClean="0"/>
+              <a:rPr lang="ja-JP" altLang="en-US" sz="2100" dirty="0" smtClean="0"/>
               <a:t>（月）　</a:t>
             </a:r>
             <a:r>
-              <a:rPr lang="en-US" altLang="ja-JP" sz="2000" dirty="0" smtClean="0"/>
+              <a:rPr lang="en-US" altLang="ja-JP" sz="2100" dirty="0" smtClean="0"/>
               <a:t>16</a:t>
             </a:r>
             <a:r>
-              <a:rPr lang="ja-JP" altLang="en-US" sz="2000" dirty="0" smtClean="0"/>
+              <a:rPr lang="ja-JP" altLang="en-US" sz="2100" dirty="0" smtClean="0"/>
               <a:t>日間</a:t>
             </a:r>
             <a:r>
@@ -3843,146 +4319,157 @@
             </a:r>
           </a:p>
           <a:p>
+            <a:pPr lvl="1"/>
             <a:endParaRPr lang="en-US" altLang="ja-JP" sz="1500" dirty="0"/>
           </a:p>
           <a:p>
             <a:r>
-              <a:rPr lang="ja-JP" altLang="en-US" sz="2600" dirty="0" smtClean="0"/>
+              <a:rPr lang="ja-JP" altLang="en-US" sz="2800" dirty="0" smtClean="0"/>
+              <a:t>目的</a:t>
+            </a:r>
+            <a:endParaRPr lang="en-US" altLang="ja-JP" sz="2800" dirty="0" smtClean="0"/>
+          </a:p>
+          <a:p>
+            <a:pPr lvl="1"/>
+            <a:r>
+              <a:rPr lang="ja-JP" altLang="en-US" sz="2100" dirty="0" smtClean="0"/>
+              <a:t>開発工程の基本的な流れを体験する</a:t>
+            </a:r>
+            <a:endParaRPr lang="en-US" altLang="ja-JP" sz="2100" dirty="0" smtClean="0"/>
+          </a:p>
+          <a:p>
+            <a:pPr lvl="2"/>
+            <a:r>
+              <a:rPr lang="ja-JP" altLang="en-US" sz="1600" dirty="0" smtClean="0"/>
+              <a:t>要件定義、設計、実装、テスト</a:t>
+            </a:r>
+            <a:endParaRPr lang="en-US" altLang="ja-JP" sz="1600" dirty="0" smtClean="0"/>
+          </a:p>
+          <a:p>
+            <a:pPr lvl="1"/>
+            <a:r>
+              <a:rPr lang="ja-JP" altLang="en-US" sz="2100" dirty="0" smtClean="0"/>
+              <a:t>開発ツールの基本を学ぶ</a:t>
+            </a:r>
+            <a:endParaRPr lang="en-US" altLang="ja-JP" sz="2000" dirty="0" smtClean="0"/>
+          </a:p>
+          <a:p>
+            <a:pPr lvl="2"/>
+            <a:r>
+              <a:rPr lang="en-US" altLang="ja-JP" sz="1600" dirty="0" smtClean="0"/>
+              <a:t>Eclipse (Plugin)</a:t>
+            </a:r>
+          </a:p>
+          <a:p>
+            <a:pPr lvl="2"/>
+            <a:r>
+              <a:rPr lang="en-US" altLang="ja-JP" sz="1600" dirty="0" err="1" smtClean="0"/>
+              <a:t>Git</a:t>
+            </a:r>
+            <a:endParaRPr lang="en-US" altLang="ja-JP" sz="1600" dirty="0"/>
+          </a:p>
+          <a:p>
+            <a:pPr lvl="1"/>
+            <a:endParaRPr lang="en-US" altLang="ja-JP" sz="2100" dirty="0" smtClean="0"/>
+          </a:p>
+          <a:p>
+            <a:r>
+              <a:rPr lang="ja-JP" altLang="en-US" sz="2800" dirty="0" smtClean="0"/>
               <a:t>内容</a:t>
             </a:r>
             <a:r>
-              <a:rPr lang="en-US" altLang="ja-JP" sz="2600" dirty="0" smtClean="0"/>
+              <a:rPr lang="en-US" altLang="ja-JP" sz="2800" dirty="0"/>
               <a:t/>
             </a:r>
             <a:br>
-              <a:rPr lang="en-US" altLang="ja-JP" sz="2600" dirty="0" smtClean="0"/>
+              <a:rPr lang="en-US" altLang="ja-JP" sz="2800" dirty="0"/>
             </a:br>
             <a:r>
-              <a:rPr lang="ja-JP" altLang="en-US" sz="2400" dirty="0" smtClean="0"/>
+              <a:rPr lang="ja-JP" altLang="en-US" sz="2800" dirty="0"/>
               <a:t>① </a:t>
             </a:r>
             <a:r>
-              <a:rPr lang="en-US" altLang="ja-JP" sz="2400" dirty="0" smtClean="0"/>
+              <a:rPr lang="en-US" altLang="ja-JP" sz="2800" dirty="0"/>
               <a:t>Sirius</a:t>
             </a:r>
             <a:r>
-              <a:rPr lang="ja-JP" altLang="en-US" sz="2400" dirty="0" smtClean="0"/>
+              <a:rPr lang="ja-JP" altLang="en-US" sz="2800" dirty="0"/>
               <a:t>で作るアクティビティ図</a:t>
             </a:r>
             <a:r>
-              <a:rPr lang="en-US" altLang="ja-JP" sz="2400" dirty="0" smtClean="0"/>
+              <a:rPr lang="en-US" altLang="ja-JP" sz="2800" dirty="0"/>
               <a:t>Editor</a:t>
             </a:r>
             <a:br>
-              <a:rPr lang="en-US" altLang="ja-JP" sz="2400" dirty="0" smtClean="0"/>
+              <a:rPr lang="en-US" altLang="ja-JP" sz="2800" dirty="0"/>
             </a:br>
             <a:r>
-              <a:rPr lang="ja-JP" altLang="en-US" sz="2400" dirty="0" smtClean="0"/>
+              <a:rPr lang="ja-JP" altLang="en-US" sz="2800" dirty="0"/>
               <a:t>② </a:t>
             </a:r>
             <a:r>
-              <a:rPr lang="en-US" altLang="ja-JP" sz="2400" dirty="0" smtClean="0"/>
+              <a:rPr lang="en-US" altLang="ja-JP" sz="2800" dirty="0"/>
               <a:t>JavaFX</a:t>
             </a:r>
             <a:r>
-              <a:rPr lang="ja-JP" altLang="en-US" sz="2400" dirty="0" smtClean="0"/>
+              <a:rPr lang="ja-JP" altLang="en-US" sz="2800" dirty="0"/>
               <a:t>で作るチャート</a:t>
             </a:r>
             <a:r>
-              <a:rPr lang="en-US" altLang="ja-JP" sz="2400" dirty="0" smtClean="0"/>
+              <a:rPr lang="en-US" altLang="ja-JP" sz="2800" dirty="0" smtClean="0"/>
               <a:t>Viewer</a:t>
             </a:r>
+            <a:endParaRPr lang="en-US" altLang="ja-JP" sz="2800" dirty="0"/>
+          </a:p>
+          <a:p>
+            <a:endParaRPr lang="en-US" altLang="ja-JP" sz="2500" dirty="0" smtClean="0"/>
+          </a:p>
+          <a:p>
+            <a:r>
+              <a:rPr lang="ja-JP" altLang="en-US" sz="2800" dirty="0" smtClean="0"/>
+              <a:t>成果物</a:t>
+            </a:r>
+            <a:endParaRPr lang="en-US" altLang="ja-JP" sz="2800" dirty="0" smtClean="0"/>
           </a:p>
           <a:p>
             <a:pPr lvl="1"/>
-            <a:endParaRPr lang="en-US" altLang="ja-JP" sz="1200" dirty="0" smtClean="0"/>
+            <a:r>
+              <a:rPr lang="en-US" altLang="ja-JP" sz="2100" dirty="0" smtClean="0"/>
+              <a:t>Editor/Viewer</a:t>
+            </a:r>
+            <a:r>
+              <a:rPr lang="ja-JP" altLang="en-US" sz="2100" dirty="0" smtClean="0"/>
+              <a:t>本体</a:t>
+            </a:r>
+            <a:endParaRPr lang="en-US" altLang="ja-JP" sz="2100" dirty="0" smtClean="0"/>
           </a:p>
           <a:p>
             <a:pPr lvl="1"/>
             <a:r>
-              <a:rPr lang="ja-JP" altLang="en-US" sz="2000" dirty="0" smtClean="0"/>
-              <a:t>開発工程の基本的な流れを体験（要件定義、設計、実装、テスト）</a:t>
-            </a:r>
-            <a:endParaRPr lang="en-US" altLang="ja-JP" sz="2000" dirty="0" smtClean="0"/>
+              <a:rPr lang="ja-JP" altLang="en-US" sz="2100" dirty="0" smtClean="0"/>
+              <a:t>要件定義書、設計書、テストケース表、テスト証跡</a:t>
+            </a:r>
+            <a:endParaRPr lang="en-US" altLang="ja-JP" sz="2100" dirty="0" smtClean="0"/>
           </a:p>
           <a:p>
             <a:pPr lvl="1"/>
             <a:r>
-              <a:rPr lang="ja-JP" altLang="en-US" sz="2000" dirty="0" smtClean="0"/>
-              <a:t>新機能</a:t>
-            </a:r>
-            <a:r>
-              <a:rPr lang="ja-JP" altLang="en-US" sz="2000" dirty="0"/>
-              <a:t>の提案</a:t>
-            </a:r>
-            <a:endParaRPr lang="en-US" altLang="ja-JP" sz="2000" dirty="0"/>
+              <a:rPr lang="ja-JP" altLang="en-US" sz="2100" dirty="0" smtClean="0"/>
+              <a:t>調査資料</a:t>
+            </a:r>
+            <a:endParaRPr lang="en-US" altLang="ja-JP" sz="2100" dirty="0" smtClean="0"/>
           </a:p>
           <a:p>
             <a:pPr lvl="1"/>
-            <a:endParaRPr lang="en-US" altLang="ja-JP" sz="1300" dirty="0" smtClean="0"/>
-          </a:p>
-          <a:p>
-            <a:r>
-              <a:rPr lang="ja-JP" altLang="en-US" sz="2600" dirty="0" smtClean="0"/>
-              <a:t>成果物</a:t>
-            </a:r>
-            <a:endParaRPr lang="en-US" altLang="ja-JP" sz="2400" dirty="0" smtClean="0"/>
-          </a:p>
-          <a:p>
-            <a:pPr lvl="1"/>
-            <a:r>
-              <a:rPr lang="ja-JP" altLang="en-US" sz="2000" dirty="0"/>
-              <a:t>アプリケーション</a:t>
-            </a:r>
-            <a:endParaRPr lang="en-US" altLang="ja-JP" sz="2000" dirty="0" smtClean="0"/>
-          </a:p>
-          <a:p>
-            <a:pPr lvl="2"/>
-            <a:r>
-              <a:rPr lang="en-US" altLang="ja-JP" sz="1600" dirty="0" smtClean="0"/>
-              <a:t>Editor/Viewer</a:t>
-            </a:r>
-            <a:r>
-              <a:rPr lang="ja-JP" altLang="en-US" sz="1600" dirty="0" smtClean="0"/>
-              <a:t>本体</a:t>
-            </a:r>
-            <a:endParaRPr lang="en-US" altLang="ja-JP" sz="1600" dirty="0" smtClean="0"/>
-          </a:p>
-          <a:p>
-            <a:pPr lvl="2"/>
-            <a:r>
-              <a:rPr lang="ja-JP" altLang="en-US" sz="1600" dirty="0" smtClean="0"/>
-              <a:t>要件定義書、設計書</a:t>
-            </a:r>
-            <a:r>
-              <a:rPr lang="ja-JP" altLang="en-US" sz="1600" dirty="0" smtClean="0"/>
-              <a:t>、テストケース表</a:t>
-            </a:r>
-            <a:r>
-              <a:rPr lang="ja-JP" altLang="en-US" sz="1600" dirty="0" smtClean="0"/>
-              <a:t>、テスト証跡</a:t>
-            </a:r>
-            <a:endParaRPr lang="en-US" altLang="ja-JP" sz="1600" dirty="0" smtClean="0"/>
-          </a:p>
-          <a:p>
-            <a:pPr lvl="1"/>
-            <a:r>
-              <a:rPr lang="ja-JP" altLang="en-US" sz="2000" dirty="0" smtClean="0"/>
-              <a:t>調査資料</a:t>
-            </a:r>
-            <a:endParaRPr lang="en-US" altLang="ja-JP" sz="2000" dirty="0" smtClean="0"/>
-          </a:p>
-          <a:p>
-            <a:pPr lvl="1"/>
-            <a:r>
-              <a:rPr lang="ja-JP" altLang="en-US" sz="2000" dirty="0"/>
+            <a:r>
+              <a:rPr lang="ja-JP" altLang="en-US" sz="2100" dirty="0"/>
               <a:t>発表</a:t>
             </a:r>
             <a:r>
-              <a:rPr lang="ja-JP" altLang="en-US" sz="2000" dirty="0" smtClean="0"/>
+              <a:rPr lang="ja-JP" altLang="en-US" sz="2100" dirty="0" smtClean="0"/>
               <a:t>資料</a:t>
             </a:r>
-            <a:endParaRPr lang="en-US" altLang="ja-JP" sz="2000" dirty="0" smtClean="0"/>
+            <a:endParaRPr lang="en-US" altLang="ja-JP" sz="2100" dirty="0" smtClean="0"/>
           </a:p>
           <a:p>
             <a:endParaRPr lang="en-US" altLang="ja-JP" sz="2400" dirty="0"/>
@@ -4037,7 +4524,7 @@
       </p:grpSpPr>
       <p:sp>
         <p:nvSpPr>
-          <p:cNvPr id="4" name="タイトル 3"/>
+          <p:cNvPr id="2" name="タイトル 1"/>
           <p:cNvSpPr>
             <a:spLocks noGrp="1"/>
           </p:cNvSpPr>
@@ -4052,7 +4539,7 @@
           <a:p>
             <a:r>
               <a:rPr kumimoji="1" lang="ja-JP" altLang="en-US" dirty="0" smtClean="0"/>
-              <a:t>研修の進め方</a:t>
+              <a:t>研修案</a:t>
             </a:r>
             <a:endParaRPr kumimoji="1" lang="ja-JP" altLang="en-US" dirty="0"/>
           </a:p>
@@ -4060,7 +4547,7 @@
       </p:sp>
       <p:sp>
         <p:nvSpPr>
-          <p:cNvPr id="2" name="コンテンツ プレースホルダー 1"/>
+          <p:cNvPr id="3" name="コンテンツ プレースホルダー 2"/>
           <p:cNvSpPr>
             <a:spLocks noGrp="1"/>
           </p:cNvSpPr>
@@ -4068,210 +4555,169 @@
             <p:ph idx="1"/>
           </p:nvPr>
         </p:nvSpPr>
-        <p:spPr>
-          <a:prstGeom prst="rect">
-            <a:avLst/>
-          </a:prstGeom>
-        </p:spPr>
+        <p:spPr/>
         <p:txBody>
           <a:bodyPr>
-            <a:normAutofit/>
+            <a:normAutofit fontScale="92500" lnSpcReduction="20000"/>
           </a:bodyPr>
           <a:lstStyle/>
           <a:p>
-            <a:r>
-              <a:rPr lang="ja-JP" altLang="en-US" sz="2400" dirty="0" smtClean="0"/>
-              <a:t>２段階研修（基礎</a:t>
-            </a:r>
-            <a:r>
-              <a:rPr lang="en-US" altLang="ja-JP" sz="2400" dirty="0" smtClean="0"/>
-              <a:t>/</a:t>
-            </a:r>
-            <a:r>
-              <a:rPr lang="ja-JP" altLang="en-US" sz="2400" dirty="0" smtClean="0"/>
-              <a:t>応用）</a:t>
-            </a:r>
-            <a:endParaRPr lang="en-US" altLang="ja-JP" sz="2400" dirty="0" smtClean="0"/>
+            <a:pPr marL="0" indent="0">
+              <a:buNone/>
+            </a:pPr>
+            <a:r>
+              <a:rPr kumimoji="1" lang="ja-JP" altLang="en-US" dirty="0" smtClean="0"/>
+              <a:t>２チーム構成（成果物は１人１個）</a:t>
+            </a:r>
+            <a:endParaRPr kumimoji="1" lang="en-US" altLang="ja-JP" dirty="0" smtClean="0"/>
+          </a:p>
+          <a:p>
+            <a:r>
+              <a:rPr kumimoji="1" lang="en-US" altLang="ja-JP" dirty="0" smtClean="0"/>
+              <a:t>Sirius</a:t>
+            </a:r>
+            <a:r>
+              <a:rPr kumimoji="1" lang="ja-JP" altLang="en-US" dirty="0" smtClean="0"/>
+              <a:t>チーム（吉田さん）：久米、呉屋</a:t>
+            </a:r>
+            <a:endParaRPr kumimoji="1" lang="en-US" altLang="ja-JP" dirty="0" smtClean="0"/>
+          </a:p>
+          <a:p>
+            <a:pPr lvl="2"/>
+            <a:r>
+              <a:rPr kumimoji="1" lang="ja-JP" altLang="en-US" dirty="0" smtClean="0"/>
+              <a:t>モデルベース開発</a:t>
+            </a:r>
+            <a:r>
+              <a:rPr kumimoji="1" lang="en-US" altLang="ja-JP" dirty="0" smtClean="0"/>
+              <a:t>, Eclipse Plugin</a:t>
+            </a:r>
+            <a:r>
+              <a:rPr kumimoji="1" lang="ja-JP" altLang="en-US" dirty="0" smtClean="0"/>
+              <a:t>の勉強</a:t>
+            </a:r>
+            <a:endParaRPr kumimoji="1" lang="en-US" altLang="ja-JP" dirty="0" smtClean="0"/>
           </a:p>
           <a:p>
             <a:pPr lvl="1"/>
             <a:r>
-              <a:rPr lang="ja-JP" altLang="en-US" sz="2000" dirty="0" smtClean="0"/>
-              <a:t>基礎研修：基本となる</a:t>
-            </a:r>
-            <a:r>
-              <a:rPr lang="en-US" altLang="ja-JP" sz="2000" dirty="0" smtClean="0"/>
-              <a:t>Editor/Viewer</a:t>
-            </a:r>
-            <a:r>
-              <a:rPr lang="ja-JP" altLang="en-US" sz="2000" dirty="0" smtClean="0"/>
-              <a:t>作成</a:t>
-            </a:r>
-            <a:endParaRPr lang="en-US" altLang="ja-JP" sz="2000" dirty="0" smtClean="0"/>
+              <a:rPr kumimoji="1" lang="en-US" altLang="ja-JP" dirty="0" smtClean="0"/>
+              <a:t>Sirius</a:t>
+            </a:r>
+            <a:r>
+              <a:rPr kumimoji="1" lang="ja-JP" altLang="en-US" dirty="0" smtClean="0"/>
+              <a:t>調査</a:t>
+            </a:r>
+            <a:endParaRPr kumimoji="1" lang="en-US" altLang="ja-JP" dirty="0" smtClean="0"/>
           </a:p>
           <a:p>
             <a:pPr lvl="1"/>
             <a:r>
-              <a:rPr lang="ja-JP" altLang="en-US" sz="2000" dirty="0" smtClean="0"/>
-              <a:t>応用研修：各個人にテーマを与え、基本</a:t>
-            </a:r>
-            <a:r>
-              <a:rPr lang="en-US" altLang="ja-JP" sz="2000" dirty="0"/>
-              <a:t>Editor/Viewer</a:t>
-            </a:r>
-            <a:r>
-              <a:rPr lang="ja-JP" altLang="en-US" sz="2000" dirty="0" smtClean="0"/>
-              <a:t>改良</a:t>
-            </a:r>
-            <a:endParaRPr lang="en-US" altLang="ja-JP" sz="2000" dirty="0" smtClean="0"/>
-          </a:p>
-          <a:p>
-            <a:endParaRPr lang="en-US" altLang="ja-JP" sz="2400" dirty="0" smtClean="0"/>
-          </a:p>
-          <a:p>
-            <a:r>
-              <a:rPr lang="ja-JP" altLang="en-US" sz="2400" dirty="0" smtClean="0"/>
-              <a:t>各成果物</a:t>
-            </a:r>
-            <a:r>
-              <a:rPr lang="ja-JP" altLang="en-US" sz="2400" dirty="0"/>
-              <a:t>に</a:t>
-            </a:r>
-            <a:r>
-              <a:rPr lang="ja-JP" altLang="en-US" sz="2400" dirty="0" smtClean="0"/>
-              <a:t>対し、レビューを行う</a:t>
-            </a:r>
-            <a:endParaRPr lang="en-US" altLang="ja-JP" sz="2400" dirty="0" smtClean="0"/>
+              <a:rPr kumimoji="1" lang="ja-JP" altLang="en-US" dirty="0" smtClean="0"/>
+              <a:t>サンプルとしてアクティビティ図</a:t>
+            </a:r>
+            <a:r>
+              <a:rPr kumimoji="1" lang="en-US" altLang="ja-JP" dirty="0" smtClean="0"/>
+              <a:t>Editor</a:t>
+            </a:r>
+          </a:p>
+          <a:p>
+            <a:endParaRPr lang="en-US" altLang="ja-JP" dirty="0" smtClean="0"/>
+          </a:p>
+          <a:p>
+            <a:r>
+              <a:rPr lang="en-US" altLang="ja-JP" dirty="0" smtClean="0"/>
+              <a:t>JavaFX</a:t>
+            </a:r>
+            <a:r>
+              <a:rPr lang="ja-JP" altLang="en-US" dirty="0" smtClean="0"/>
+              <a:t>チーム（坂本さん）：横田、本間</a:t>
+            </a:r>
+            <a:endParaRPr lang="en-US" altLang="ja-JP" dirty="0" smtClean="0"/>
           </a:p>
           <a:p>
             <a:pPr lvl="1"/>
             <a:r>
-              <a:rPr lang="ja-JP" altLang="en-US" sz="2000" dirty="0" smtClean="0"/>
-              <a:t>要件定義書</a:t>
-            </a:r>
-            <a:endParaRPr lang="en-US" altLang="ja-JP" sz="2000" dirty="0" smtClean="0"/>
+              <a:rPr lang="ja-JP" altLang="en-US" dirty="0"/>
+              <a:t>波形</a:t>
+            </a:r>
+            <a:r>
+              <a:rPr lang="ja-JP" altLang="en-US" dirty="0" smtClean="0"/>
+              <a:t>の</a:t>
+            </a:r>
+            <a:r>
+              <a:rPr lang="en-US" altLang="ja-JP" dirty="0" smtClean="0"/>
+              <a:t>Viewer</a:t>
+            </a:r>
+          </a:p>
+          <a:p>
+            <a:pPr lvl="2"/>
+            <a:r>
+              <a:rPr lang="ja-JP" altLang="en-US" dirty="0" smtClean="0"/>
+              <a:t>スタンドアローンの</a:t>
+            </a:r>
+            <a:r>
+              <a:rPr lang="en-US" altLang="ja-JP" dirty="0" smtClean="0"/>
+              <a:t>EXE</a:t>
+            </a:r>
+          </a:p>
+          <a:p>
+            <a:pPr lvl="2"/>
+            <a:r>
+              <a:rPr lang="ja-JP" altLang="en-US" dirty="0" smtClean="0"/>
+              <a:t>入力値は様々な形式の離散値</a:t>
+            </a:r>
+            <a:endParaRPr lang="en-US" altLang="ja-JP" dirty="0" smtClean="0"/>
+          </a:p>
+          <a:p>
+            <a:pPr lvl="3"/>
+            <a:r>
+              <a:rPr lang="en-US" altLang="ja-JP" dirty="0" smtClean="0"/>
+              <a:t>0/10/20</a:t>
+            </a:r>
+            <a:r>
+              <a:rPr lang="ja-JP" altLang="en-US" dirty="0" smtClean="0"/>
+              <a:t>とか</a:t>
+            </a:r>
+            <a:r>
+              <a:rPr lang="en-US" altLang="ja-JP" dirty="0" smtClean="0"/>
+              <a:t>Low/Mid/High</a:t>
+            </a:r>
+          </a:p>
+          <a:p>
+            <a:pPr lvl="2"/>
+            <a:r>
+              <a:rPr lang="ja-JP" altLang="en-US" dirty="0" smtClean="0"/>
+              <a:t>波形はデジタル信号のようなもの</a:t>
+            </a:r>
+            <a:endParaRPr lang="en-US" altLang="ja-JP" dirty="0" smtClean="0"/>
           </a:p>
           <a:p>
             <a:pPr lvl="1"/>
             <a:r>
-              <a:rPr lang="ja-JP" altLang="en-US" sz="2000" dirty="0" smtClean="0"/>
-              <a:t>設計書</a:t>
-            </a:r>
-            <a:endParaRPr lang="en-US" altLang="ja-JP" sz="2000" dirty="0" smtClean="0"/>
-          </a:p>
-          <a:p>
-            <a:pPr lvl="1"/>
-            <a:r>
-              <a:rPr lang="ja-JP" altLang="en-US" sz="2000" dirty="0" smtClean="0"/>
-              <a:t>コード</a:t>
-            </a:r>
-            <a:endParaRPr lang="en-US" altLang="ja-JP" sz="2000" dirty="0" smtClean="0"/>
-          </a:p>
-          <a:p>
-            <a:pPr lvl="1"/>
-            <a:r>
-              <a:rPr lang="ja-JP" altLang="en-US" sz="2000" dirty="0" smtClean="0"/>
-              <a:t>テスト（テストケース、実施結果）</a:t>
-            </a:r>
-            <a:endParaRPr lang="en-US" altLang="ja-JP" sz="2000" dirty="0" smtClean="0"/>
-          </a:p>
-          <a:p>
-            <a:pPr lvl="1"/>
-            <a:r>
-              <a:rPr lang="ja-JP" altLang="en-US" sz="2000" dirty="0" smtClean="0"/>
-              <a:t>発表資料</a:t>
-            </a:r>
-            <a:endParaRPr lang="en-US" altLang="ja-JP" sz="2000" dirty="0" smtClean="0"/>
-          </a:p>
-          <a:p>
-            <a:pPr lvl="1"/>
-            <a:endParaRPr lang="en-US" altLang="ja-JP" sz="2000" dirty="0" smtClean="0"/>
-          </a:p>
-          <a:p>
-            <a:r>
-              <a:rPr lang="en-US" altLang="ja-JP" sz="2400" dirty="0"/>
-              <a:t>1</a:t>
-            </a:r>
-            <a:r>
-              <a:rPr lang="ja-JP" altLang="en-US" sz="2400" dirty="0"/>
-              <a:t>日のスケジュール（</a:t>
-            </a:r>
-            <a:r>
-              <a:rPr lang="ja-JP" altLang="en-US" sz="2000" dirty="0"/>
-              <a:t>研修時間：</a:t>
-            </a:r>
-            <a:r>
-              <a:rPr lang="en-US" altLang="ja-JP" sz="2000" dirty="0"/>
-              <a:t>10</a:t>
-            </a:r>
-            <a:r>
-              <a:rPr lang="ja-JP" altLang="en-US" sz="2000" dirty="0"/>
-              <a:t>～</a:t>
-            </a:r>
-            <a:r>
-              <a:rPr lang="en-US" altLang="ja-JP" sz="2000" dirty="0"/>
-              <a:t>19</a:t>
-            </a:r>
-            <a:r>
-              <a:rPr lang="ja-JP" altLang="en-US" sz="2000" dirty="0"/>
-              <a:t>時）</a:t>
-            </a:r>
-            <a:endParaRPr lang="en-US" altLang="ja-JP" sz="1600" dirty="0"/>
-          </a:p>
-          <a:p>
-            <a:pPr lvl="1"/>
-            <a:r>
-              <a:rPr lang="en-US" altLang="ja-JP" sz="2000" dirty="0"/>
-              <a:t>18:00</a:t>
-            </a:r>
-            <a:r>
-              <a:rPr lang="ja-JP" altLang="en-US" sz="2000" dirty="0"/>
-              <a:t>～</a:t>
-            </a:r>
-            <a:r>
-              <a:rPr lang="en-US" altLang="ja-JP" sz="2000" dirty="0"/>
-              <a:t>18:30 </a:t>
-            </a:r>
-            <a:r>
-              <a:rPr lang="ja-JP" altLang="en-US" sz="2000" dirty="0"/>
-              <a:t>夕会</a:t>
-            </a:r>
-            <a:endParaRPr lang="en-US" altLang="ja-JP" sz="2000" dirty="0"/>
-          </a:p>
-          <a:p>
-            <a:pPr lvl="2"/>
-            <a:r>
-              <a:rPr lang="ja-JP" altLang="en-US" sz="1600" dirty="0"/>
-              <a:t>簡単に</a:t>
-            </a:r>
-            <a:r>
-              <a:rPr lang="en-US" altLang="ja-JP" sz="1600" dirty="0"/>
-              <a:t>1</a:t>
-            </a:r>
-            <a:r>
-              <a:rPr lang="ja-JP" altLang="en-US" sz="1600" dirty="0"/>
-              <a:t>日の成果報告</a:t>
-            </a:r>
-            <a:endParaRPr lang="en-US" altLang="ja-JP" sz="1600" dirty="0"/>
-          </a:p>
-          <a:p>
-            <a:pPr lvl="1"/>
-            <a:r>
-              <a:rPr lang="en-US" altLang="ja-JP" sz="2000" dirty="0"/>
-              <a:t>18:30</a:t>
-            </a:r>
-            <a:r>
-              <a:rPr lang="ja-JP" altLang="en-US" sz="2000" dirty="0"/>
-              <a:t>～日報作成　</a:t>
-            </a:r>
-            <a:endParaRPr lang="en-US" altLang="ja-JP" sz="2000" dirty="0"/>
+              <a:rPr lang="ja-JP" altLang="en-US" dirty="0" smtClean="0"/>
+              <a:t>（動画再生と同時に値を送信するアプリケーション</a:t>
+            </a:r>
+            <a:r>
+              <a:rPr lang="ja-JP" altLang="en-US" dirty="0" smtClean="0"/>
+              <a:t>）</a:t>
+            </a:r>
+            <a:r>
+              <a:rPr lang="en-US" altLang="ja-JP" dirty="0" smtClean="0"/>
+              <a:t>CAN</a:t>
+            </a:r>
+            <a:r>
+              <a:rPr lang="ja-JP" altLang="en-US" dirty="0" smtClean="0"/>
+              <a:t>関連</a:t>
+            </a:r>
+            <a:endParaRPr lang="en-US" altLang="ja-JP" dirty="0" smtClean="0"/>
           </a:p>
         </p:txBody>
       </p:sp>
     </p:spTree>
     <p:extLst>
       <p:ext uri="{BB962C8B-B14F-4D97-AF65-F5344CB8AC3E}">
-        <p14:creationId xmlns:p14="http://schemas.microsoft.com/office/powerpoint/2010/main" val="3197206624"/>
+        <p14:creationId xmlns:p14="http://schemas.microsoft.com/office/powerpoint/2010/main" val="390100218"/>
       </p:ext>
     </p:extLst>
   </p:cSld>
@@ -4307,7 +4753,7 @@
       </p:grpSpPr>
       <p:sp>
         <p:nvSpPr>
-          <p:cNvPr id="2" name="タイトル 1"/>
+          <p:cNvPr id="4" name="タイトル 3"/>
           <p:cNvSpPr>
             <a:spLocks noGrp="1"/>
           </p:cNvSpPr>
@@ -4322,7 +4768,7 @@
           <a:p>
             <a:r>
               <a:rPr kumimoji="1" lang="ja-JP" altLang="en-US" dirty="0" smtClean="0"/>
-              <a:t>研修案</a:t>
+              <a:t>研修の進め方</a:t>
             </a:r>
             <a:endParaRPr kumimoji="1" lang="ja-JP" altLang="en-US" dirty="0"/>
           </a:p>
@@ -4330,7 +4776,7 @@
       </p:sp>
       <p:sp>
         <p:nvSpPr>
-          <p:cNvPr id="3" name="コンテンツ プレースホルダー 2"/>
+          <p:cNvPr id="2" name="コンテンツ プレースホルダー 1"/>
           <p:cNvSpPr>
             <a:spLocks noGrp="1"/>
           </p:cNvSpPr>
@@ -4338,86 +4784,218 @@
             <p:ph idx="1"/>
           </p:nvPr>
         </p:nvSpPr>
-        <p:spPr/>
-        <p:txBody>
-          <a:bodyPr/>
+        <p:spPr>
+          <a:prstGeom prst="rect">
+            <a:avLst/>
+          </a:prstGeom>
+        </p:spPr>
+        <p:txBody>
+          <a:bodyPr>
+            <a:normAutofit/>
+          </a:bodyPr>
           <a:lstStyle/>
           <a:p>
-            <a:pPr marL="0" indent="0">
-              <a:buNone/>
-            </a:pPr>
-            <a:r>
-              <a:rPr kumimoji="1" lang="ja-JP" altLang="en-US" dirty="0" smtClean="0"/>
-              <a:t>２チーム構成（成果物は１人１個）</a:t>
-            </a:r>
-            <a:endParaRPr kumimoji="1" lang="en-US" altLang="ja-JP" dirty="0" smtClean="0"/>
-          </a:p>
-          <a:p>
-            <a:r>
-              <a:rPr kumimoji="1" lang="en-US" altLang="ja-JP" dirty="0" smtClean="0"/>
-              <a:t>Sirius</a:t>
-            </a:r>
-            <a:r>
-              <a:rPr kumimoji="1" lang="ja-JP" altLang="en-US" dirty="0" smtClean="0"/>
-              <a:t>チーム</a:t>
-            </a:r>
-            <a:endParaRPr kumimoji="1" lang="en-US" altLang="ja-JP" dirty="0" smtClean="0"/>
+            <a:r>
+              <a:rPr lang="ja-JP" altLang="en-US" sz="2400" dirty="0" smtClean="0"/>
+              <a:t>２段階研修（基礎</a:t>
+            </a:r>
+            <a:r>
+              <a:rPr lang="en-US" altLang="ja-JP" sz="2400" dirty="0" smtClean="0"/>
+              <a:t>/</a:t>
+            </a:r>
+            <a:r>
+              <a:rPr lang="ja-JP" altLang="en-US" sz="2400" dirty="0" smtClean="0"/>
+              <a:t>応用）</a:t>
+            </a:r>
+            <a:endParaRPr lang="en-US" altLang="ja-JP" sz="2400" dirty="0" smtClean="0"/>
           </a:p>
           <a:p>
             <a:pPr lvl="1"/>
             <a:r>
-              <a:rPr kumimoji="1" lang="ja-JP" altLang="en-US" dirty="0" smtClean="0"/>
-              <a:t>アクティビティ図</a:t>
-            </a:r>
-            <a:r>
-              <a:rPr kumimoji="1" lang="en-US" altLang="ja-JP" dirty="0" smtClean="0"/>
-              <a:t>Editor</a:t>
-            </a:r>
-          </a:p>
-          <a:p>
-            <a:r>
-              <a:rPr lang="en-US" altLang="ja-JP" dirty="0" smtClean="0"/>
-              <a:t>JavaFX</a:t>
-            </a:r>
-            <a:r>
-              <a:rPr lang="ja-JP" altLang="en-US" dirty="0" smtClean="0"/>
-              <a:t>チーム</a:t>
-            </a:r>
-            <a:endParaRPr lang="en-US" altLang="ja-JP" dirty="0" smtClean="0"/>
+              <a:rPr lang="ja-JP" altLang="en-US" sz="2000" dirty="0" smtClean="0"/>
+              <a:t>基礎研修：基本となる</a:t>
+            </a:r>
+            <a:r>
+              <a:rPr lang="en-US" altLang="ja-JP" sz="2000" dirty="0" smtClean="0"/>
+              <a:t>Editor/Viewer</a:t>
+            </a:r>
+            <a:r>
+              <a:rPr lang="ja-JP" altLang="en-US" sz="2000" dirty="0" smtClean="0"/>
+              <a:t>作成</a:t>
+            </a:r>
+            <a:endParaRPr lang="en-US" altLang="ja-JP" sz="2000" dirty="0" smtClean="0"/>
           </a:p>
           <a:p>
             <a:pPr lvl="1"/>
             <a:r>
-              <a:rPr lang="ja-JP" altLang="en-US" dirty="0" smtClean="0"/>
-              <a:t>チャート</a:t>
-            </a:r>
-            <a:r>
-              <a:rPr lang="ja-JP" altLang="en-US" dirty="0" smtClean="0"/>
-              <a:t>の</a:t>
-            </a:r>
-            <a:r>
-              <a:rPr lang="en-US" altLang="ja-JP" dirty="0" smtClean="0"/>
-              <a:t>Viewer</a:t>
-            </a:r>
+              <a:rPr lang="ja-JP" altLang="en-US" sz="2000" dirty="0" smtClean="0"/>
+              <a:t>応用研修：各個人にテーマを与え、基本</a:t>
+            </a:r>
+            <a:r>
+              <a:rPr lang="en-US" altLang="ja-JP" sz="2000" dirty="0"/>
+              <a:t>Editor/Viewer</a:t>
+            </a:r>
+            <a:r>
+              <a:rPr lang="ja-JP" altLang="en-US" sz="2000" dirty="0" smtClean="0"/>
+              <a:t>改良</a:t>
+            </a:r>
+            <a:endParaRPr lang="en-US" altLang="ja-JP" sz="2000" dirty="0" smtClean="0"/>
+          </a:p>
+          <a:p>
+            <a:endParaRPr lang="en-US" altLang="ja-JP" sz="2400" dirty="0" smtClean="0"/>
+          </a:p>
+          <a:p>
+            <a:r>
+              <a:rPr lang="ja-JP" altLang="en-US" sz="2400" dirty="0" smtClean="0"/>
+              <a:t>各成果物</a:t>
+            </a:r>
+            <a:r>
+              <a:rPr lang="ja-JP" altLang="en-US" sz="2400" dirty="0"/>
+              <a:t>に</a:t>
+            </a:r>
+            <a:r>
+              <a:rPr lang="ja-JP" altLang="en-US" sz="2400" dirty="0" smtClean="0"/>
+              <a:t>対し、レビューを行う</a:t>
+            </a:r>
+            <a:endParaRPr lang="en-US" altLang="ja-JP" sz="2400" dirty="0" smtClean="0"/>
           </a:p>
           <a:p>
             <a:pPr lvl="1"/>
             <a:r>
-              <a:rPr kumimoji="1" lang="ja-JP" altLang="en-US" dirty="0" smtClean="0"/>
-              <a:t>アクティビティ図</a:t>
-            </a:r>
-            <a:r>
-              <a:rPr kumimoji="1" lang="en-US" altLang="ja-JP" dirty="0" smtClean="0"/>
-              <a:t>Viewer</a:t>
-            </a:r>
-            <a:endParaRPr kumimoji="1" lang="ja-JP" altLang="en-US" dirty="0"/>
+              <a:rPr lang="ja-JP" altLang="en-US" sz="2000" dirty="0" smtClean="0"/>
+              <a:t>要件定義書</a:t>
+            </a:r>
+            <a:endParaRPr lang="en-US" altLang="ja-JP" sz="2000" dirty="0" smtClean="0"/>
+          </a:p>
+          <a:p>
+            <a:pPr lvl="1"/>
+            <a:r>
+              <a:rPr lang="ja-JP" altLang="en-US" sz="2000" dirty="0" smtClean="0"/>
+              <a:t>設計書</a:t>
+            </a:r>
+            <a:endParaRPr lang="en-US" altLang="ja-JP" sz="2000" dirty="0" smtClean="0"/>
+          </a:p>
+          <a:p>
+            <a:pPr lvl="1"/>
+            <a:r>
+              <a:rPr lang="ja-JP" altLang="en-US" sz="2000" dirty="0" smtClean="0"/>
+              <a:t>コード</a:t>
+            </a:r>
+            <a:endParaRPr lang="en-US" altLang="ja-JP" sz="2000" dirty="0" smtClean="0"/>
+          </a:p>
+          <a:p>
+            <a:pPr lvl="1"/>
+            <a:r>
+              <a:rPr lang="ja-JP" altLang="en-US" sz="2000" dirty="0" smtClean="0"/>
+              <a:t>テスト（テストケース、実施結果）</a:t>
+            </a:r>
+            <a:endParaRPr lang="en-US" altLang="ja-JP" sz="2000" dirty="0" smtClean="0"/>
+          </a:p>
+          <a:p>
+            <a:pPr lvl="1"/>
+            <a:r>
+              <a:rPr lang="ja-JP" altLang="en-US" sz="2000" dirty="0" smtClean="0"/>
+              <a:t>発表資料</a:t>
+            </a:r>
+            <a:endParaRPr lang="en-US" altLang="ja-JP" sz="2000" dirty="0" smtClean="0"/>
+          </a:p>
+          <a:p>
+            <a:pPr lvl="1"/>
+            <a:endParaRPr lang="en-US" altLang="ja-JP" sz="2000" dirty="0" smtClean="0"/>
+          </a:p>
+          <a:p>
+            <a:r>
+              <a:rPr lang="en-US" altLang="ja-JP" sz="2400" dirty="0"/>
+              <a:t>1</a:t>
+            </a:r>
+            <a:r>
+              <a:rPr lang="ja-JP" altLang="en-US" sz="2400" dirty="0"/>
+              <a:t>日の</a:t>
+            </a:r>
+            <a:r>
+              <a:rPr lang="ja-JP" altLang="en-US" sz="2400" dirty="0" smtClean="0"/>
+              <a:t>スケジュール</a:t>
+            </a:r>
+            <a:r>
+              <a:rPr lang="ja-JP" altLang="en-US" sz="2400" dirty="0"/>
+              <a:t>（</a:t>
+            </a:r>
+            <a:r>
+              <a:rPr lang="en-US" altLang="ja-JP" sz="2000" dirty="0" smtClean="0"/>
+              <a:t>10:00</a:t>
+            </a:r>
+            <a:r>
+              <a:rPr lang="ja-JP" altLang="en-US" sz="2000" dirty="0" smtClean="0"/>
+              <a:t>～</a:t>
+            </a:r>
+            <a:r>
+              <a:rPr lang="en-US" altLang="ja-JP" sz="2000" dirty="0" smtClean="0"/>
+              <a:t>19:00</a:t>
+            </a:r>
+            <a:r>
+              <a:rPr lang="ja-JP" altLang="en-US" sz="2000" dirty="0" smtClean="0"/>
+              <a:t>）</a:t>
+            </a:r>
+            <a:endParaRPr lang="en-US" altLang="ja-JP" sz="1600" dirty="0"/>
+          </a:p>
+          <a:p>
+            <a:pPr lvl="1"/>
+            <a:r>
+              <a:rPr lang="en-US" altLang="ja-JP" sz="2000" dirty="0"/>
+              <a:t>18:00</a:t>
+            </a:r>
+            <a:r>
+              <a:rPr lang="ja-JP" altLang="en-US" sz="2000" dirty="0"/>
+              <a:t>～</a:t>
+            </a:r>
+            <a:r>
+              <a:rPr lang="en-US" altLang="ja-JP" sz="2000" dirty="0"/>
+              <a:t>18:30 </a:t>
+            </a:r>
+            <a:r>
+              <a:rPr lang="ja-JP" altLang="en-US" sz="2000" dirty="0"/>
+              <a:t>夕会</a:t>
+            </a:r>
+            <a:endParaRPr lang="en-US" altLang="ja-JP" sz="2000" dirty="0"/>
+          </a:p>
+          <a:p>
+            <a:pPr lvl="2"/>
+            <a:r>
+              <a:rPr lang="en-US" altLang="ja-JP" sz="1600" dirty="0" smtClean="0"/>
+              <a:t>1</a:t>
+            </a:r>
+            <a:r>
+              <a:rPr lang="ja-JP" altLang="en-US" sz="1600" dirty="0"/>
+              <a:t>日の成果</a:t>
+            </a:r>
+            <a:r>
+              <a:rPr lang="ja-JP" altLang="en-US" sz="1600" dirty="0" smtClean="0"/>
+              <a:t>報告、困ったことがないか、等</a:t>
+            </a:r>
+            <a:endParaRPr lang="en-US" altLang="ja-JP" sz="1600" dirty="0"/>
+          </a:p>
+          <a:p>
+            <a:pPr lvl="1"/>
+            <a:r>
+              <a:rPr lang="en-US" altLang="ja-JP" sz="2000" dirty="0"/>
+              <a:t>18:30</a:t>
+            </a:r>
+            <a:r>
+              <a:rPr lang="ja-JP" altLang="en-US" sz="2000" dirty="0" smtClean="0"/>
+              <a:t>～ 日報</a:t>
+            </a:r>
+            <a:r>
+              <a:rPr lang="ja-JP" altLang="en-US" sz="2000" dirty="0"/>
+              <a:t>作成　</a:t>
+            </a:r>
+            <a:endParaRPr lang="en-US" altLang="ja-JP" sz="2000" dirty="0"/>
           </a:p>
         </p:txBody>
       </p:sp>
     </p:spTree>
     <p:extLst>
       <p:ext uri="{BB962C8B-B14F-4D97-AF65-F5344CB8AC3E}">
-        <p14:creationId xmlns:p14="http://schemas.microsoft.com/office/powerpoint/2010/main" val="390100218"/>
+        <p14:creationId xmlns:p14="http://schemas.microsoft.com/office/powerpoint/2010/main" val="3197206624"/>
       </p:ext>
     </p:extLst>
   </p:cSld>
@@ -4474,41 +5052,6 @@
           </a:p>
         </p:txBody>
       </p:sp>
-      <p:sp>
-        <p:nvSpPr>
-          <p:cNvPr id="2" name="コンテンツ プレースホルダー 1"/>
-          <p:cNvSpPr>
-            <a:spLocks noGrp="1"/>
-          </p:cNvSpPr>
-          <p:nvPr>
-            <p:ph idx="1"/>
-          </p:nvPr>
-        </p:nvSpPr>
-        <p:spPr>
-          <a:prstGeom prst="rect">
-            <a:avLst/>
-          </a:prstGeom>
-        </p:spPr>
-        <p:txBody>
-          <a:bodyPr/>
-          <a:lstStyle/>
-          <a:p>
-            <a:endParaRPr lang="en-US" altLang="ja-JP" sz="2400" dirty="0"/>
-          </a:p>
-          <a:p>
-            <a:pPr marL="457200" lvl="1" indent="0">
-              <a:buNone/>
-            </a:pPr>
-            <a:endParaRPr lang="en-US" altLang="ja-JP" sz="2000" dirty="0" smtClean="0"/>
-          </a:p>
-          <a:p>
-            <a:pPr marL="457200" lvl="1" indent="0">
-              <a:buNone/>
-            </a:pPr>
-            <a:endParaRPr lang="en-US" altLang="ja-JP" sz="2000" dirty="0"/>
-          </a:p>
-        </p:txBody>
-      </p:sp>
       <p:graphicFrame>
         <p:nvGraphicFramePr>
           <p:cNvPr id="4" name="表 3"/>
@@ -4518,7 +5061,7 @@
           <p:nvPr>
             <p:extLst>
               <p:ext uri="{D42A27DB-BD31-4B8C-83A1-F6EECF244321}">
-                <p14:modId xmlns:p14="http://schemas.microsoft.com/office/powerpoint/2010/main" val="3916249970"/>
+                <p14:modId xmlns:p14="http://schemas.microsoft.com/office/powerpoint/2010/main" val="2883252172"/>
               </p:ext>
             </p:extLst>
           </p:nvPr>
@@ -5003,10 +5546,6 @@
                       <a:br>
                         <a:rPr kumimoji="1" lang="en-US" altLang="ja-JP" dirty="0" smtClean="0"/>
                       </a:br>
-                      <a:r>
-                        <a:rPr kumimoji="1" lang="ja-JP" altLang="en-US" sz="1400" dirty="0" smtClean="0"/>
-                        <a:t>応用研修の説明</a:t>
-                      </a:r>
                       <a:endParaRPr kumimoji="1" lang="ja-JP" altLang="en-US" dirty="0"/>
                     </a:p>
                   </a:txBody>
@@ -6131,7 +6670,7 @@
         <p:spPr>
           <a:xfrm>
             <a:off x="1809772" y="1639235"/>
-            <a:ext cx="2154488" cy="709551"/>
+            <a:ext cx="4465020" cy="709551"/>
           </a:xfrm>
           <a:prstGeom prst="leftRightArrow">
             <a:avLst>
@@ -6160,79 +6699,10 @@
           <a:p>
             <a:pPr algn="ctr"/>
             <a:r>
-              <a:rPr kumimoji="1" lang="ja-JP" altLang="en-US" sz="1400" dirty="0" smtClean="0">
-                <a:solidFill>
-                  <a:schemeClr val="tx1"/>
-                </a:solidFill>
-              </a:rPr>
-              <a:t>基礎研修</a:t>
-            </a:r>
-            <a:endParaRPr kumimoji="1" lang="ja-JP" altLang="en-US" sz="1400" dirty="0">
-              <a:solidFill>
-                <a:schemeClr val="tx1"/>
-              </a:solidFill>
-            </a:endParaRPr>
-          </a:p>
-        </p:txBody>
-      </p:sp>
-      <p:sp>
-        <p:nvSpPr>
-          <p:cNvPr id="18" name="左右矢印 17"/>
-          <p:cNvSpPr/>
-          <p:nvPr/>
-        </p:nvSpPr>
-        <p:spPr>
-          <a:xfrm>
-            <a:off x="4076730" y="2062178"/>
-            <a:ext cx="2223462" cy="364112"/>
-          </a:xfrm>
-          <a:prstGeom prst="leftRightArrow">
-            <a:avLst>
-              <a:gd name="adj1" fmla="val 70964"/>
-              <a:gd name="adj2" fmla="val 45962"/>
-            </a:avLst>
-          </a:prstGeom>
-        </p:spPr>
-        <p:style>
-          <a:lnRef idx="1">
-            <a:schemeClr val="accent6"/>
-          </a:lnRef>
-          <a:fillRef idx="2">
-            <a:schemeClr val="accent6"/>
-          </a:fillRef>
-          <a:effectRef idx="1">
-            <a:schemeClr val="accent6"/>
-          </a:effectRef>
-          <a:fontRef idx="minor">
-            <a:schemeClr val="dk1"/>
-          </a:fontRef>
-        </p:style>
-        <p:txBody>
-          <a:bodyPr rtlCol="0" anchor="ctr"/>
-          <a:lstStyle/>
-          <a:p>
-            <a:pPr algn="ctr"/>
-            <a:r>
-              <a:rPr lang="ja-JP" altLang="en-US" sz="1400" dirty="0">
-                <a:solidFill>
-                  <a:schemeClr val="tx1"/>
-                </a:solidFill>
-              </a:rPr>
-              <a:t>要求</a:t>
-            </a:r>
-            <a:r>
-              <a:rPr lang="ja-JP" altLang="en-US" sz="1400" dirty="0" smtClean="0">
-                <a:solidFill>
-                  <a:schemeClr val="tx1"/>
-                </a:solidFill>
-              </a:rPr>
-              <a:t>分析・要件定義</a:t>
-            </a:r>
-            <a:endParaRPr kumimoji="1" lang="en-US" altLang="ja-JP" sz="1400" dirty="0" smtClean="0">
-              <a:solidFill>
-                <a:schemeClr val="tx1"/>
-              </a:solidFill>
-            </a:endParaRPr>
+              <a:rPr lang="ja-JP" altLang="en-US" sz="1400" dirty="0" smtClean="0"/>
+              <a:t>説明・調査・準備</a:t>
+            </a:r>
+            <a:endParaRPr lang="en-US" altLang="ja-JP" sz="1400" dirty="0" smtClean="0"/>
           </a:p>
         </p:txBody>
       </p:sp>
@@ -6579,7 +7049,7 @@
         <p:spPr>
           <a:xfrm>
             <a:off x="5724128" y="4949077"/>
-            <a:ext cx="2217020" cy="947164"/>
+            <a:ext cx="1832248" cy="947164"/>
           </a:xfrm>
           <a:prstGeom prst="wedgeRoundRectCallout">
             <a:avLst>
@@ -6618,7 +7088,7 @@
             <a:pPr algn="ctr"/>
             <a:r>
               <a:rPr lang="ja-JP" altLang="en-US" dirty="0" smtClean="0"/>
-              <a:t>発表資料レビュー</a:t>
+              <a:t>発表練習</a:t>
             </a:r>
             <a:endParaRPr lang="en-US" altLang="ja-JP" dirty="0" smtClean="0"/>
           </a:p>
@@ -6681,41 +7151,6 @@
               <a:t>研修開始までの予定</a:t>
             </a:r>
             <a:endParaRPr kumimoji="1" lang="ja-JP" altLang="en-US" dirty="0"/>
-          </a:p>
-        </p:txBody>
-      </p:sp>
-      <p:sp>
-        <p:nvSpPr>
-          <p:cNvPr id="2" name="コンテンツ プレースホルダー 1"/>
-          <p:cNvSpPr>
-            <a:spLocks noGrp="1"/>
-          </p:cNvSpPr>
-          <p:nvPr>
-            <p:ph idx="1"/>
-          </p:nvPr>
-        </p:nvSpPr>
-        <p:spPr>
-          <a:prstGeom prst="rect">
-            <a:avLst/>
-          </a:prstGeom>
-        </p:spPr>
-        <p:txBody>
-          <a:bodyPr/>
-          <a:lstStyle/>
-          <a:p>
-            <a:endParaRPr lang="en-US" altLang="ja-JP" sz="2400" dirty="0"/>
-          </a:p>
-          <a:p>
-            <a:pPr marL="457200" lvl="1" indent="0">
-              <a:buNone/>
-            </a:pPr>
-            <a:endParaRPr lang="en-US" altLang="ja-JP" sz="2000" dirty="0" smtClean="0"/>
-          </a:p>
-          <a:p>
-            <a:pPr marL="457200" lvl="1" indent="0">
-              <a:buNone/>
-            </a:pPr>
-            <a:endParaRPr lang="en-US" altLang="ja-JP" sz="2000" dirty="0"/>
           </a:p>
         </p:txBody>
       </p:sp>
@@ -7674,11 +8109,7 @@
                       </a:pPr>
                       <a:r>
                         <a:rPr kumimoji="1" lang="ja-JP" altLang="en-US" dirty="0" smtClean="0"/>
-                        <a:t>説明資料</a:t>
-                      </a:r>
-                      <a:r>
-                        <a:rPr kumimoji="1" lang="ja-JP" altLang="en-US" dirty="0" smtClean="0"/>
-                        <a:t>作成</a:t>
+                        <a:t>説明資料作成</a:t>
                       </a:r>
                       <a:endParaRPr kumimoji="1" lang="en-US" altLang="ja-JP" dirty="0" smtClean="0"/>
                     </a:p>
@@ -8103,6 +8534,105 @@
                 <a:schemeClr val="tx1"/>
               </a:solidFill>
             </a:endParaRPr>
+          </a:p>
+        </p:txBody>
+      </p:sp>
+      <p:sp>
+        <p:nvSpPr>
+          <p:cNvPr id="8" name="テキスト ボックス 7"/>
+          <p:cNvSpPr txBox="1"/>
+          <p:nvPr/>
+        </p:nvSpPr>
+        <p:spPr>
+          <a:xfrm>
+            <a:off x="388875" y="5445224"/>
+            <a:ext cx="6297878" cy="1107996"/>
+          </a:xfrm>
+          <a:prstGeom prst="rect">
+            <a:avLst/>
+          </a:prstGeom>
+          <a:noFill/>
+        </p:spPr>
+        <p:txBody>
+          <a:bodyPr wrap="none" rtlCol="0">
+            <a:spAutoFit/>
+          </a:bodyPr>
+          <a:lstStyle/>
+          <a:p>
+            <a:r>
+              <a:rPr kumimoji="1" lang="ja-JP" altLang="en-US" dirty="0" smtClean="0"/>
+              <a:t>次回ミーティングまでの齋藤タスク</a:t>
+            </a:r>
+            <a:endParaRPr kumimoji="1" lang="en-US" altLang="ja-JP" dirty="0" smtClean="0"/>
+          </a:p>
+          <a:p>
+            <a:pPr marL="285750" indent="-285750">
+              <a:buFont typeface="Arial" panose="020B0604020202020204" pitchFamily="34" charset="0"/>
+              <a:buChar char="•"/>
+            </a:pPr>
+            <a:r>
+              <a:rPr lang="ja-JP" altLang="en-US" sz="1600" dirty="0" smtClean="0"/>
+              <a:t>研修内容の詳細計画</a:t>
+            </a:r>
+            <a:endParaRPr lang="en-US" altLang="ja-JP" sz="1600" dirty="0" smtClean="0"/>
+          </a:p>
+          <a:p>
+            <a:pPr marL="285750" indent="-285750">
+              <a:buFont typeface="Arial" panose="020B0604020202020204" pitchFamily="34" charset="0"/>
+              <a:buChar char="•"/>
+            </a:pPr>
+            <a:r>
+              <a:rPr lang="ja-JP" altLang="en-US" sz="1600" dirty="0" smtClean="0"/>
+              <a:t>サンプルエディタ</a:t>
+            </a:r>
+            <a:r>
+              <a:rPr lang="ja-JP" altLang="en-US" sz="1600" dirty="0"/>
+              <a:t>作成</a:t>
+            </a:r>
+            <a:endParaRPr lang="en-US" altLang="ja-JP" sz="1600" dirty="0" smtClean="0"/>
+          </a:p>
+          <a:p>
+            <a:pPr marL="285750" indent="-285750">
+              <a:buFont typeface="Arial" panose="020B0604020202020204" pitchFamily="34" charset="0"/>
+              <a:buChar char="•"/>
+            </a:pPr>
+            <a:r>
+              <a:rPr lang="ja-JP" altLang="en-US" sz="1600" dirty="0" smtClean="0"/>
+              <a:t>新人</a:t>
+            </a:r>
+            <a:r>
+              <a:rPr lang="en-US" altLang="ja-JP" sz="1600" dirty="0" smtClean="0"/>
+              <a:t>Java</a:t>
+            </a:r>
+            <a:r>
+              <a:rPr lang="ja-JP" altLang="en-US" sz="1600" dirty="0" smtClean="0"/>
+              <a:t>研修</a:t>
+            </a:r>
+            <a:r>
+              <a:rPr lang="en-US" altLang="ja-JP" sz="1600" dirty="0" smtClean="0"/>
+              <a:t>(@MSE</a:t>
+            </a:r>
+            <a:r>
+              <a:rPr lang="en-US" altLang="ja-JP" sz="1600" dirty="0"/>
+              <a:t>)</a:t>
+            </a:r>
+            <a:r>
+              <a:rPr lang="ja-JP" altLang="en-US" sz="1600" dirty="0" smtClean="0"/>
+              <a:t>の</a:t>
+            </a:r>
+            <a:r>
+              <a:rPr lang="en-US" altLang="ja-JP" sz="1600" dirty="0" smtClean="0"/>
+              <a:t>Java</a:t>
+            </a:r>
+            <a:r>
+              <a:rPr lang="ja-JP" altLang="en-US" sz="1600" dirty="0" smtClean="0"/>
+              <a:t>開発環境を確認する → </a:t>
+            </a:r>
+            <a:r>
+              <a:rPr lang="en-US" altLang="ja-JP" sz="1600" dirty="0" smtClean="0"/>
+              <a:t>Java1.8?Eclipse?</a:t>
+            </a:r>
+            <a:endParaRPr kumimoji="1" lang="ja-JP" altLang="en-US" sz="1600" dirty="0"/>
           </a:p>
         </p:txBody>
       </p:sp>
@@ -8407,4 +8937,289 @@
   <a:objectDefaults/>
   <a:extraClrSchemeLst/>
 </a:theme>
+</file>
+
+<file path=ppt/theme/theme2.xml><?xml version="1.0" encoding="utf-8"?>
+<a:theme xmlns:a="http://schemas.openxmlformats.org/drawingml/2006/main" name="Office ​​テーマ">
+  <a:themeElements>
+    <a:clrScheme name="Office">
+      <a:dk1>
+        <a:sysClr val="windowText" lastClr="000000"/>
+      </a:dk1>
+      <a:lt1>
+        <a:sysClr val="window" lastClr="FFFFFF"/>
+      </a:lt1>
+      <a:dk2>
+        <a:srgbClr val="1F497D"/>
+      </a:dk2>
+      <a:lt2>
+        <a:srgbClr val="EEECE1"/>
+      </a:lt2>
+      <a:accent1>
+        <a:srgbClr val="4F81BD"/>
+      </a:accent1>
+      <a:accent2>
+        <a:srgbClr val="C0504D"/>
+      </a:accent2>
+      <a:accent3>
+        <a:srgbClr val="9BBB59"/>
+      </a:accent3>
+      <a:accent4>
+        <a:srgbClr val="8064A2"/>
+      </a:accent4>
+      <a:accent5>
+        <a:srgbClr val="4BACC6"/>
+      </a:accent5>
+      <a:accent6>
+        <a:srgbClr val="F79646"/>
+      </a:accent6>
+      <a:hlink>
+        <a:srgbClr val="0000FF"/>
+      </a:hlink>
+      <a:folHlink>
+        <a:srgbClr val="800080"/>
+      </a:folHlink>
+    </a:clrScheme>
+    <a:fontScheme name="Office">
+      <a:majorFont>
+        <a:latin typeface="Calibri"/>
+        <a:ea typeface=""/>
+        <a:cs typeface=""/>
+        <a:font script="Jpan" typeface="ＭＳ Ｐゴシック"/>
+        <a:font script="Hang" typeface="맑은 고딕"/>
+        <a:font script="Hans" typeface="宋体"/>
+        <a:font script="Hant" typeface="新細明體"/>
+        <a:font script="Arab" typeface="Times New Roman"/>
+        <a:font script="Hebr" typeface="Times New Roman"/>
+        <a:font script="Thai" typeface="Angsana New"/>
+        <a:font script="Ethi" typeface="Nyala"/>
+        <a:font script="Beng" typeface="Vrinda"/>
+        <a:font script="Gujr" typeface="Shruti"/>
+        <a:font script="Khmr" typeface="MoolBoran"/>
+        <a:font script="Knda" typeface="Tunga"/>
+        <a:font script="Guru" typeface="Raavi"/>
+        <a:font script="Cans" typeface="Euphemia"/>
+        <a:font script="Cher" typeface="Plantagenet Cherokee"/>
+        <a:font script="Yiii" typeface="Microsoft Yi Baiti"/>
+        <a:font script="Tibt" typeface="Microsoft Himalaya"/>
+        <a:font script="Thaa" typeface="MV Boli"/>
+        <a:font script="Deva" typeface="Mangal"/>
+        <a:font script="Telu" typeface="Gautami"/>
+        <a:font script="Taml" typeface="Latha"/>
+        <a:font script="Syrc" typeface="Estrangelo Edessa"/>
+        <a:font script="Orya" typeface="Kalinga"/>
+        <a:font script="Mlym" typeface="Kartika"/>
+        <a:font script="Laoo" typeface="DokChampa"/>
+        <a:font script="Sinh" typeface="Iskoola Pota"/>
+        <a:font script="Mong" typeface="Mongolian Baiti"/>
+        <a:font script="Viet" typeface="Times New Roman"/>
+        <a:font script="Uigh" typeface="Microsoft Uighur"/>
+        <a:font script="Geor" typeface="Sylfaen"/>
+      </a:majorFont>
+      <a:minorFont>
+        <a:latin typeface="Calibri"/>
+        <a:ea typeface=""/>
+        <a:cs typeface=""/>
+        <a:font script="Jpan" typeface="ＭＳ Ｐゴシック"/>
+        <a:font script="Hang" typeface="맑은 고딕"/>
+        <a:font script="Hans" typeface="宋体"/>
+        <a:font script="Hant" typeface="新細明體"/>
+        <a:font script="Arab" typeface="Arial"/>
+        <a:font script="Hebr" typeface="Arial"/>
+        <a:font script="Thai" typeface="Cordia New"/>
+        <a:font script="Ethi" typeface="Nyala"/>
+        <a:font script="Beng" typeface="Vrinda"/>
+        <a:font script="Gujr" typeface="Shruti"/>
+        <a:font script="Khmr" typeface="DaunPenh"/>
+        <a:font script="Knda" typeface="Tunga"/>
+        <a:font script="Guru" typeface="Raavi"/>
+        <a:font script="Cans" typeface="Euphemia"/>
+        <a:font script="Cher" typeface="Plantagenet Cherokee"/>
+        <a:font script="Yiii" typeface="Microsoft Yi Baiti"/>
+        <a:font script="Tibt" typeface="Microsoft Himalaya"/>
+        <a:font script="Thaa" typeface="MV Boli"/>
+        <a:font script="Deva" typeface="Mangal"/>
+        <a:font script="Telu" typeface="Gautami"/>
+        <a:font script="Taml" typeface="Latha"/>
+        <a:font script="Syrc" typeface="Estrangelo Edessa"/>
+        <a:font script="Orya" typeface="Kalinga"/>
+        <a:font script="Mlym" typeface="Kartika"/>
+        <a:font script="Laoo" typeface="DokChampa"/>
+        <a:font script="Sinh" typeface="Iskoola Pota"/>
+        <a:font script="Mong" typeface="Mongolian Baiti"/>
+        <a:font script="Viet" typeface="Arial"/>
+        <a:font script="Uigh" typeface="Microsoft Uighur"/>
+        <a:font script="Geor" typeface="Sylfaen"/>
+      </a:minorFont>
+    </a:fontScheme>
+    <a:fmtScheme name="Office">
+      <a:fillStyleLst>
+        <a:solidFill>
+          <a:schemeClr val="phClr"/>
+        </a:solidFill>
+        <a:gradFill rotWithShape="1">
+          <a:gsLst>
+            <a:gs pos="0">
+              <a:schemeClr val="phClr">
+                <a:tint val="50000"/>
+                <a:satMod val="300000"/>
+              </a:schemeClr>
+            </a:gs>
+            <a:gs pos="35000">
+              <a:schemeClr val="phClr">
+                <a:tint val="37000"/>
+                <a:satMod val="300000"/>
+              </a:schemeClr>
+            </a:gs>
+            <a:gs pos="100000">
+              <a:schemeClr val="phClr">
+                <a:tint val="15000"/>
+                <a:satMod val="350000"/>
+              </a:schemeClr>
+            </a:gs>
+          </a:gsLst>
+          <a:lin ang="16200000" scaled="1"/>
+        </a:gradFill>
+        <a:gradFill rotWithShape="1">
+          <a:gsLst>
+            <a:gs pos="0">
+              <a:schemeClr val="phClr">
+                <a:shade val="51000"/>
+                <a:satMod val="130000"/>
+              </a:schemeClr>
+            </a:gs>
+            <a:gs pos="80000">
+              <a:schemeClr val="phClr">
+                <a:shade val="93000"/>
+                <a:satMod val="130000"/>
+              </a:schemeClr>
+            </a:gs>
+            <a:gs pos="100000">
+              <a:schemeClr val="phClr">
+                <a:shade val="94000"/>
+                <a:satMod val="135000"/>
+              </a:schemeClr>
+            </a:gs>
+          </a:gsLst>
+          <a:lin ang="16200000" scaled="0"/>
+        </a:gradFill>
+      </a:fillStyleLst>
+      <a:lnStyleLst>
+        <a:ln w="9525" cap="flat" cmpd="sng" algn="ctr">
+          <a:solidFill>
+            <a:schemeClr val="phClr">
+              <a:shade val="95000"/>
+              <a:satMod val="105000"/>
+            </a:schemeClr>
+          </a:solidFill>
+          <a:prstDash val="solid"/>
+        </a:ln>
+        <a:ln w="25400" cap="flat" cmpd="sng" algn="ctr">
+          <a:solidFill>
+            <a:schemeClr val="phClr"/>
+          </a:solidFill>
+          <a:prstDash val="solid"/>
+        </a:ln>
+        <a:ln w="38100" cap="flat" cmpd="sng" algn="ctr">
+          <a:solidFill>
+            <a:schemeClr val="phClr"/>
+          </a:solidFill>
+          <a:prstDash val="solid"/>
+        </a:ln>
+      </a:lnStyleLst>
+      <a:effectStyleLst>
+        <a:effectStyle>
+          <a:effectLst>
+            <a:outerShdw blurRad="40000" dist="20000" dir="5400000" rotWithShape="0">
+              <a:srgbClr val="000000">
+                <a:alpha val="38000"/>
+              </a:srgbClr>
+            </a:outerShdw>
+          </a:effectLst>
+        </a:effectStyle>
+        <a:effectStyle>
+          <a:effectLst>
+            <a:outerShdw blurRad="40000" dist="23000" dir="5400000" rotWithShape="0">
+              <a:srgbClr val="000000">
+                <a:alpha val="35000"/>
+              </a:srgbClr>
+            </a:outerShdw>
+          </a:effectLst>
+        </a:effectStyle>
+        <a:effectStyle>
+          <a:effectLst>
+            <a:outerShdw blurRad="40000" dist="23000" dir="5400000" rotWithShape="0">
+              <a:srgbClr val="000000">
+                <a:alpha val="35000"/>
+              </a:srgbClr>
+            </a:outerShdw>
+          </a:effectLst>
+          <a:scene3d>
+            <a:camera prst="orthographicFront">
+              <a:rot lat="0" lon="0" rev="0"/>
+            </a:camera>
+            <a:lightRig rig="threePt" dir="t">
+              <a:rot lat="0" lon="0" rev="1200000"/>
+            </a:lightRig>
+          </a:scene3d>
+          <a:sp3d>
+            <a:bevelT w="63500" h="25400"/>
+          </a:sp3d>
+        </a:effectStyle>
+      </a:effectStyleLst>
+      <a:bgFillStyleLst>
+        <a:solidFill>
+          <a:schemeClr val="phClr"/>
+        </a:solidFill>
+        <a:gradFill rotWithShape="1">
+          <a:gsLst>
+            <a:gs pos="0">
+              <a:schemeClr val="phClr">
+                <a:tint val="40000"/>
+                <a:satMod val="350000"/>
+              </a:schemeClr>
+            </a:gs>
+            <a:gs pos="40000">
+              <a:schemeClr val="phClr">
+                <a:tint val="45000"/>
+                <a:shade val="99000"/>
+                <a:satMod val="350000"/>
+              </a:schemeClr>
+            </a:gs>
+            <a:gs pos="100000">
+              <a:schemeClr val="phClr">
+                <a:shade val="20000"/>
+                <a:satMod val="255000"/>
+              </a:schemeClr>
+            </a:gs>
+          </a:gsLst>
+          <a:path path="circle">
+            <a:fillToRect l="50000" t="-80000" r="50000" b="180000"/>
+          </a:path>
+        </a:gradFill>
+        <a:gradFill rotWithShape="1">
+          <a:gsLst>
+            <a:gs pos="0">
+              <a:schemeClr val="phClr">
+                <a:tint val="80000"/>
+                <a:satMod val="300000"/>
+              </a:schemeClr>
+            </a:gs>
+            <a:gs pos="100000">
+              <a:schemeClr val="phClr">
+                <a:shade val="30000"/>
+                <a:satMod val="200000"/>
+              </a:schemeClr>
+            </a:gs>
+          </a:gsLst>
+          <a:path path="circle">
+            <a:fillToRect l="50000" t="50000" r="50000" b="50000"/>
+          </a:path>
+        </a:gradFill>
+      </a:bgFillStyleLst>
+    </a:fmtScheme>
+  </a:themeElements>
+  <a:objectDefaults/>
+  <a:extraClrSchemeLst/>
+</a:theme>
 </file>
</xml_diff>